<commit_message>
Updated presentation with new figure and slides. Still need to update EPE in table..
</commit_message>
<xml_diff>
--- a/presentation.pptx
+++ b/presentation.pptx
@@ -5,7 +5,7 @@
     <p:sldMasterId id="2147483648" r:id="rId1"/>
   </p:sldMasterIdLst>
   <p:notesMasterIdLst>
-    <p:notesMasterId r:id="rId10"/>
+    <p:notesMasterId r:id="rId13"/>
   </p:notesMasterIdLst>
   <p:sldIdLst>
     <p:sldId id="256" r:id="rId2"/>
@@ -13,9 +13,12 @@
     <p:sldId id="257" r:id="rId4"/>
     <p:sldId id="265" r:id="rId5"/>
     <p:sldId id="263" r:id="rId6"/>
-    <p:sldId id="261" r:id="rId7"/>
-    <p:sldId id="264" r:id="rId8"/>
-    <p:sldId id="262" r:id="rId9"/>
+    <p:sldId id="266" r:id="rId7"/>
+    <p:sldId id="261" r:id="rId8"/>
+    <p:sldId id="264" r:id="rId9"/>
+    <p:sldId id="267" r:id="rId10"/>
+    <p:sldId id="268" r:id="rId11"/>
+    <p:sldId id="262" r:id="rId12"/>
   </p:sldIdLst>
   <p:sldSz cx="9144000" cy="6858000" type="screen4x3"/>
   <p:notesSz cx="6858000" cy="9144000"/>
@@ -892,7 +895,7 @@
           <a:p>
             <a:fld id="{C58ED5D4-3292-3A40-921D-BB18EB839827}" type="slidenum">
               <a:rPr lang="en-US" smtClean="0"/>
-              <a:t>6</a:t>
+              <a:t>7</a:t>
             </a:fld>
             <a:endParaRPr lang="en-US"/>
           </a:p>
@@ -976,7 +979,7 @@
           <a:p>
             <a:fld id="{C58ED5D4-3292-3A40-921D-BB18EB839827}" type="slidenum">
               <a:rPr lang="en-US" smtClean="0"/>
-              <a:t>7</a:t>
+              <a:t>8</a:t>
             </a:fld>
             <a:endParaRPr lang="en-US"/>
           </a:p>
@@ -3993,7 +3996,12 @@
             <p:ph type="ctrTitle"/>
           </p:nvPr>
         </p:nvSpPr>
-        <p:spPr/>
+        <p:spPr>
+          <a:xfrm>
+            <a:off x="685800" y="987425"/>
+            <a:ext cx="7772400" cy="1470025"/>
+          </a:xfrm>
+        </p:spPr>
         <p:txBody>
           <a:bodyPr>
             <a:normAutofit fontScale="90000"/>
@@ -4001,16 +4009,16 @@
           <a:lstStyle/>
           <a:p>
             <a:r>
-              <a:rPr lang="en-US" dirty="0" smtClean="0">
+              <a:rPr lang="en-US" b="1" dirty="0" smtClean="0">
                 <a:solidFill>
-                  <a:srgbClr val="000000"/>
+                  <a:srgbClr val="0000FF"/>
                 </a:solidFill>
               </a:rPr>
               <a:t>Optical Flow Estimation Using Block Matching with Weighted Median Filtering</a:t>
             </a:r>
-            <a:endParaRPr lang="en-US" dirty="0">
+            <a:endParaRPr lang="en-US" b="1" dirty="0">
               <a:solidFill>
-                <a:srgbClr val="000000"/>
+                <a:srgbClr val="0000FF"/>
               </a:solidFill>
             </a:endParaRPr>
           </a:p>
@@ -4026,32 +4034,86 @@
             <p:ph type="subTitle" idx="1"/>
           </p:nvPr>
         </p:nvSpPr>
-        <p:spPr/>
+        <p:spPr>
+          <a:xfrm>
+            <a:off x="1371600" y="4521200"/>
+            <a:ext cx="6400800" cy="1752600"/>
+          </a:xfrm>
+        </p:spPr>
         <p:txBody>
           <a:bodyPr/>
           <a:lstStyle/>
           <a:p>
             <a:r>
-              <a:rPr lang="en-US" dirty="0" err="1" smtClean="0"/>
+              <a:rPr lang="en-US" dirty="0" err="1" smtClean="0">
+                <a:solidFill>
+                  <a:schemeClr val="tx1"/>
+                </a:solidFill>
+              </a:rPr>
               <a:t>Twan</a:t>
             </a:r>
             <a:r>
-              <a:rPr lang="en-US" dirty="0" smtClean="0"/>
+              <a:rPr lang="en-US" dirty="0" smtClean="0">
+                <a:solidFill>
+                  <a:schemeClr val="tx1"/>
+                </a:solidFill>
+              </a:rPr>
               <a:t> </a:t>
             </a:r>
             <a:r>
-              <a:rPr lang="en-US" dirty="0" err="1" smtClean="0"/>
+              <a:rPr lang="en-US" dirty="0" err="1" smtClean="0">
+                <a:solidFill>
+                  <a:schemeClr val="tx1"/>
+                </a:solidFill>
+              </a:rPr>
               <a:t>Koolen</a:t>
             </a:r>
             <a:r>
-              <a:rPr lang="en-US" dirty="0" smtClean="0"/>
+              <a:rPr lang="en-US" dirty="0" smtClean="0">
+                <a:solidFill>
+                  <a:schemeClr val="tx1"/>
+                </a:solidFill>
+              </a:rPr>
               <a:t> </a:t>
             </a:r>
             <a:r>
-              <a:rPr lang="en-US" dirty="0" smtClean="0"/>
-              <a:t>and James Noraky</a:t>
-            </a:r>
-            <a:endParaRPr lang="en-US" dirty="0"/>
+              <a:rPr lang="en-US" dirty="0" smtClean="0">
+                <a:solidFill>
+                  <a:schemeClr val="tx1"/>
+                </a:solidFill>
+              </a:rPr>
+              <a:t>and James </a:t>
+            </a:r>
+            <a:r>
+              <a:rPr lang="en-US" dirty="0" smtClean="0">
+                <a:solidFill>
+                  <a:schemeClr val="tx1"/>
+                </a:solidFill>
+              </a:rPr>
+              <a:t>Noraky</a:t>
+            </a:r>
+          </a:p>
+          <a:p>
+            <a:r>
+              <a:rPr lang="en-US" dirty="0" smtClean="0">
+                <a:solidFill>
+                  <a:schemeClr val="tx1"/>
+                </a:solidFill>
+              </a:rPr>
+              <a:t>December 8, 2014</a:t>
+            </a:r>
+            <a:endParaRPr lang="en-US" dirty="0" smtClean="0">
+              <a:solidFill>
+                <a:schemeClr val="tx1"/>
+              </a:solidFill>
+            </a:endParaRPr>
+          </a:p>
+          <a:p>
+            <a:endParaRPr lang="en-US" dirty="0">
+              <a:solidFill>
+                <a:schemeClr val="tx1"/>
+              </a:solidFill>
+            </a:endParaRPr>
           </a:p>
         </p:txBody>
       </p:sp>
@@ -4059,6 +4121,465 @@
     <p:extLst>
       <p:ext uri="{BB962C8B-B14F-4D97-AF65-F5344CB8AC3E}">
         <p14:creationId xmlns:p14="http://schemas.microsoft.com/office/powerpoint/2010/main" val="4215736497"/>
+      </p:ext>
+    </p:extLst>
+  </p:cSld>
+  <p:clrMapOvr>
+    <a:masterClrMapping/>
+  </p:clrMapOvr>
+  <p:timing>
+    <p:tnLst>
+      <p:par>
+        <p:cTn xmlns:p14="http://schemas.microsoft.com/office/powerpoint/2010/main" id="1" dur="indefinite" restart="never" nodeType="tmRoot"/>
+      </p:par>
+    </p:tnLst>
+  </p:timing>
+</p:sld>
+</file>
+
+<file path=ppt/slides/slide10.xml><?xml version="1.0" encoding="utf-8"?>
+<p:sld xmlns:a="http://schemas.openxmlformats.org/drawingml/2006/main" xmlns:r="http://schemas.openxmlformats.org/officeDocument/2006/relationships" xmlns:p="http://schemas.openxmlformats.org/presentationml/2006/main">
+  <p:cSld>
+    <p:spTree>
+      <p:nvGrpSpPr>
+        <p:cNvPr id="1" name=""/>
+        <p:cNvGrpSpPr/>
+        <p:nvPr/>
+      </p:nvGrpSpPr>
+      <p:grpSpPr>
+        <a:xfrm>
+          <a:off x="0" y="0"/>
+          <a:ext cx="0" cy="0"/>
+          <a:chOff x="0" y="0"/>
+          <a:chExt cx="0" cy="0"/>
+        </a:xfrm>
+      </p:grpSpPr>
+      <p:sp>
+        <p:nvSpPr>
+          <p:cNvPr id="2" name="Title 1"/>
+          <p:cNvSpPr>
+            <a:spLocks noGrp="1"/>
+          </p:cNvSpPr>
+          <p:nvPr>
+            <p:ph type="title"/>
+          </p:nvPr>
+        </p:nvSpPr>
+        <p:spPr/>
+        <p:txBody>
+          <a:bodyPr/>
+          <a:lstStyle/>
+          <a:p>
+            <a:r>
+              <a:rPr lang="en-US" b="1" dirty="0" smtClean="0">
+                <a:solidFill>
+                  <a:srgbClr val="0000FF"/>
+                </a:solidFill>
+              </a:rPr>
+              <a:t>Results (</a:t>
+            </a:r>
+            <a:r>
+              <a:rPr lang="en-US" b="1" dirty="0" err="1" smtClean="0">
+                <a:solidFill>
+                  <a:srgbClr val="0000FF"/>
+                </a:solidFill>
+              </a:rPr>
+              <a:t>con’t</a:t>
+            </a:r>
+            <a:r>
+              <a:rPr lang="en-US" b="1" dirty="0" smtClean="0">
+                <a:solidFill>
+                  <a:srgbClr val="0000FF"/>
+                </a:solidFill>
+              </a:rPr>
+              <a:t>)</a:t>
+            </a:r>
+            <a:endParaRPr lang="en-US" b="1" dirty="0">
+              <a:solidFill>
+                <a:srgbClr val="0000FF"/>
+              </a:solidFill>
+            </a:endParaRPr>
+          </a:p>
+        </p:txBody>
+      </p:sp>
+      <p:pic>
+        <p:nvPicPr>
+          <p:cNvPr id="3" name="Picture 2"/>
+          <p:cNvPicPr>
+            <a:picLocks noChangeAspect="1"/>
+          </p:cNvPicPr>
+          <p:nvPr/>
+        </p:nvPicPr>
+        <p:blipFill>
+          <a:blip r:embed="rId2"/>
+          <a:stretch>
+            <a:fillRect/>
+          </a:stretch>
+        </p:blipFill>
+        <p:spPr>
+          <a:xfrm>
+            <a:off x="1587501" y="1608138"/>
+            <a:ext cx="2802835" cy="1828800"/>
+          </a:xfrm>
+          <a:prstGeom prst="rect">
+            <a:avLst/>
+          </a:prstGeom>
+          <a:ln w="38100" cap="sq">
+            <a:solidFill>
+              <a:srgbClr val="000000"/>
+            </a:solidFill>
+            <a:prstDash val="solid"/>
+            <a:miter lim="800000"/>
+          </a:ln>
+          <a:effectLst>
+            <a:outerShdw blurRad="50800" dist="38100" dir="2700000" algn="tl" rotWithShape="0">
+              <a:srgbClr val="000000">
+                <a:alpha val="43000"/>
+              </a:srgbClr>
+            </a:outerShdw>
+          </a:effectLst>
+        </p:spPr>
+      </p:pic>
+      <p:pic>
+        <p:nvPicPr>
+          <p:cNvPr id="7" name="Picture 6"/>
+          <p:cNvPicPr>
+            <a:picLocks noChangeAspect="1"/>
+          </p:cNvPicPr>
+          <p:nvPr/>
+        </p:nvPicPr>
+        <p:blipFill>
+          <a:blip r:embed="rId3"/>
+          <a:stretch>
+            <a:fillRect/>
+          </a:stretch>
+        </p:blipFill>
+        <p:spPr>
+          <a:xfrm>
+            <a:off x="4648201" y="1608138"/>
+            <a:ext cx="2802835" cy="1828800"/>
+          </a:xfrm>
+          <a:prstGeom prst="rect">
+            <a:avLst/>
+          </a:prstGeom>
+          <a:ln w="38100" cap="sq">
+            <a:solidFill>
+              <a:srgbClr val="000000"/>
+            </a:solidFill>
+            <a:prstDash val="solid"/>
+            <a:miter lim="800000"/>
+          </a:ln>
+          <a:effectLst>
+            <a:outerShdw blurRad="50800" dist="38100" dir="2700000" algn="tl" rotWithShape="0">
+              <a:srgbClr val="000000">
+                <a:alpha val="43000"/>
+              </a:srgbClr>
+            </a:outerShdw>
+          </a:effectLst>
+        </p:spPr>
+      </p:pic>
+      <p:sp>
+        <p:nvSpPr>
+          <p:cNvPr id="9" name="Rectangle 8"/>
+          <p:cNvSpPr/>
+          <p:nvPr/>
+        </p:nvSpPr>
+        <p:spPr>
+          <a:xfrm>
+            <a:off x="1597066" y="5903820"/>
+            <a:ext cx="6035634" cy="881028"/>
+          </a:xfrm>
+          <a:prstGeom prst="rect">
+            <a:avLst/>
+          </a:prstGeom>
+          <a:noFill/>
+          <a:ln w="28575" cmpd="sng">
+            <a:solidFill>
+              <a:srgbClr val="FF0000"/>
+            </a:solidFill>
+          </a:ln>
+          <a:effectLst/>
+        </p:spPr>
+        <p:style>
+          <a:lnRef idx="1">
+            <a:schemeClr val="accent1"/>
+          </a:lnRef>
+          <a:fillRef idx="3">
+            <a:schemeClr val="accent1"/>
+          </a:fillRef>
+          <a:effectRef idx="2">
+            <a:schemeClr val="accent1"/>
+          </a:effectRef>
+          <a:fontRef idx="minor">
+            <a:schemeClr val="lt1"/>
+          </a:fontRef>
+        </p:style>
+        <p:txBody>
+          <a:bodyPr rtlCol="0" anchor="ctr"/>
+          <a:lstStyle/>
+          <a:p>
+            <a:r>
+              <a:rPr lang="en-US" sz="2400" dirty="0" smtClean="0">
+                <a:solidFill>
+                  <a:schemeClr val="tx1"/>
+                </a:solidFill>
+              </a:rPr>
+              <a:t> </a:t>
+            </a:r>
+          </a:p>
+          <a:p>
+            <a:r>
+              <a:rPr lang="en-US" sz="2400" dirty="0" smtClean="0">
+                <a:solidFill>
+                  <a:schemeClr val="tx1"/>
+                </a:solidFill>
+              </a:rPr>
+              <a:t>TOP: Flow estimates obtained by our approach</a:t>
+            </a:r>
+          </a:p>
+          <a:p>
+            <a:r>
+              <a:rPr lang="en-US" sz="2400" dirty="0" smtClean="0">
+                <a:solidFill>
+                  <a:schemeClr val="tx1"/>
+                </a:solidFill>
+              </a:rPr>
+              <a:t>BOTTOM: Ground truth flow estimates</a:t>
+            </a:r>
+            <a:endParaRPr lang="en-US" sz="2400" dirty="0">
+              <a:solidFill>
+                <a:schemeClr val="tx1"/>
+              </a:solidFill>
+            </a:endParaRPr>
+          </a:p>
+          <a:p>
+            <a:endParaRPr lang="en-US" sz="2400" dirty="0">
+              <a:solidFill>
+                <a:schemeClr val="tx1"/>
+              </a:solidFill>
+            </a:endParaRPr>
+          </a:p>
+        </p:txBody>
+      </p:sp>
+      <p:pic>
+        <p:nvPicPr>
+          <p:cNvPr id="10" name="Picture 9"/>
+          <p:cNvPicPr>
+            <a:picLocks noChangeAspect="1"/>
+          </p:cNvPicPr>
+          <p:nvPr/>
+        </p:nvPicPr>
+        <p:blipFill>
+          <a:blip r:embed="rId4"/>
+          <a:stretch>
+            <a:fillRect/>
+          </a:stretch>
+        </p:blipFill>
+        <p:spPr>
+          <a:xfrm>
+            <a:off x="1587501" y="3657600"/>
+            <a:ext cx="2802835" cy="1828800"/>
+          </a:xfrm>
+          <a:prstGeom prst="rect">
+            <a:avLst/>
+          </a:prstGeom>
+          <a:ln w="38100" cap="sq">
+            <a:solidFill>
+              <a:srgbClr val="000000"/>
+            </a:solidFill>
+            <a:prstDash val="solid"/>
+            <a:miter lim="800000"/>
+          </a:ln>
+          <a:effectLst>
+            <a:outerShdw blurRad="50800" dist="38100" dir="2700000" algn="tl" rotWithShape="0">
+              <a:srgbClr val="000000">
+                <a:alpha val="43000"/>
+              </a:srgbClr>
+            </a:outerShdw>
+          </a:effectLst>
+        </p:spPr>
+      </p:pic>
+      <p:sp>
+        <p:nvSpPr>
+          <p:cNvPr id="11" name="TextBox 10"/>
+          <p:cNvSpPr txBox="1"/>
+          <p:nvPr/>
+        </p:nvSpPr>
+        <p:spPr>
+          <a:xfrm>
+            <a:off x="2286000" y="1207572"/>
+            <a:ext cx="1313531" cy="400110"/>
+          </a:xfrm>
+          <a:prstGeom prst="rect">
+            <a:avLst/>
+          </a:prstGeom>
+          <a:noFill/>
+        </p:spPr>
+        <p:txBody>
+          <a:bodyPr wrap="none" rtlCol="0">
+            <a:spAutoFit/>
+          </a:bodyPr>
+          <a:lstStyle/>
+          <a:p>
+            <a:r>
+              <a:rPr lang="en-US" sz="2000" u="sng" dirty="0" smtClean="0"/>
+              <a:t>Hydrangea</a:t>
+            </a:r>
+            <a:endParaRPr lang="en-US" sz="2000" u="sng" dirty="0"/>
+          </a:p>
+        </p:txBody>
+      </p:sp>
+      <p:pic>
+        <p:nvPicPr>
+          <p:cNvPr id="12" name="Picture 11"/>
+          <p:cNvPicPr>
+            <a:picLocks noChangeAspect="1"/>
+          </p:cNvPicPr>
+          <p:nvPr/>
+        </p:nvPicPr>
+        <p:blipFill>
+          <a:blip r:embed="rId5"/>
+          <a:stretch>
+            <a:fillRect/>
+          </a:stretch>
+        </p:blipFill>
+        <p:spPr>
+          <a:xfrm>
+            <a:off x="4648201" y="3657600"/>
+            <a:ext cx="2802835" cy="1828800"/>
+          </a:xfrm>
+          <a:prstGeom prst="rect">
+            <a:avLst/>
+          </a:prstGeom>
+          <a:ln w="38100" cap="sq">
+            <a:solidFill>
+              <a:srgbClr val="000000"/>
+            </a:solidFill>
+            <a:prstDash val="solid"/>
+            <a:miter lim="800000"/>
+          </a:ln>
+          <a:effectLst>
+            <a:outerShdw blurRad="50800" dist="38100" dir="2700000" algn="tl" rotWithShape="0">
+              <a:srgbClr val="000000">
+                <a:alpha val="43000"/>
+              </a:srgbClr>
+            </a:outerShdw>
+          </a:effectLst>
+        </p:spPr>
+      </p:pic>
+      <p:sp>
+        <p:nvSpPr>
+          <p:cNvPr id="13" name="TextBox 12"/>
+          <p:cNvSpPr txBox="1"/>
+          <p:nvPr/>
+        </p:nvSpPr>
+        <p:spPr>
+          <a:xfrm>
+            <a:off x="5270500" y="1183244"/>
+            <a:ext cx="1675459" cy="400110"/>
+          </a:xfrm>
+          <a:prstGeom prst="rect">
+            <a:avLst/>
+          </a:prstGeom>
+          <a:noFill/>
+        </p:spPr>
+        <p:txBody>
+          <a:bodyPr wrap="none" rtlCol="0">
+            <a:spAutoFit/>
+          </a:bodyPr>
+          <a:lstStyle/>
+          <a:p>
+            <a:r>
+              <a:rPr lang="en-US" sz="2000" u="sng" dirty="0" smtClean="0"/>
+              <a:t>Rubber Whale</a:t>
+            </a:r>
+            <a:endParaRPr lang="en-US" sz="2000" u="sng" dirty="0"/>
+          </a:p>
+        </p:txBody>
+      </p:sp>
+    </p:spTree>
+    <p:extLst>
+      <p:ext uri="{BB962C8B-B14F-4D97-AF65-F5344CB8AC3E}">
+        <p14:creationId xmlns:p14="http://schemas.microsoft.com/office/powerpoint/2010/main" val="4159280178"/>
+      </p:ext>
+    </p:extLst>
+  </p:cSld>
+  <p:clrMapOvr>
+    <a:masterClrMapping/>
+  </p:clrMapOvr>
+</p:sld>
+</file>
+
+<file path=ppt/slides/slide11.xml><?xml version="1.0" encoding="utf-8"?>
+<p:sld xmlns:a="http://schemas.openxmlformats.org/drawingml/2006/main" xmlns:r="http://schemas.openxmlformats.org/officeDocument/2006/relationships" xmlns:p="http://schemas.openxmlformats.org/presentationml/2006/main">
+  <p:cSld>
+    <p:spTree>
+      <p:nvGrpSpPr>
+        <p:cNvPr id="1" name=""/>
+        <p:cNvGrpSpPr/>
+        <p:nvPr/>
+      </p:nvGrpSpPr>
+      <p:grpSpPr>
+        <a:xfrm>
+          <a:off x="0" y="0"/>
+          <a:ext cx="0" cy="0"/>
+          <a:chOff x="0" y="0"/>
+          <a:chExt cx="0" cy="0"/>
+        </a:xfrm>
+      </p:grpSpPr>
+      <p:sp>
+        <p:nvSpPr>
+          <p:cNvPr id="2" name="Title 1"/>
+          <p:cNvSpPr>
+            <a:spLocks noGrp="1"/>
+          </p:cNvSpPr>
+          <p:nvPr>
+            <p:ph type="title"/>
+          </p:nvPr>
+        </p:nvSpPr>
+        <p:spPr/>
+        <p:txBody>
+          <a:bodyPr/>
+          <a:lstStyle/>
+          <a:p>
+            <a:r>
+              <a:rPr lang="en-US" b="1" dirty="0" smtClean="0">
+                <a:solidFill>
+                  <a:srgbClr val="0000FF"/>
+                </a:solidFill>
+              </a:rPr>
+              <a:t>Contributions (??)</a:t>
+            </a:r>
+            <a:endParaRPr lang="en-US" b="1" dirty="0">
+              <a:solidFill>
+                <a:srgbClr val="0000FF"/>
+              </a:solidFill>
+            </a:endParaRPr>
+          </a:p>
+        </p:txBody>
+      </p:sp>
+      <p:sp>
+        <p:nvSpPr>
+          <p:cNvPr id="3" name="Content Placeholder 2"/>
+          <p:cNvSpPr>
+            <a:spLocks noGrp="1"/>
+          </p:cNvSpPr>
+          <p:nvPr>
+            <p:ph idx="1"/>
+          </p:nvPr>
+        </p:nvSpPr>
+        <p:spPr/>
+        <p:txBody>
+          <a:bodyPr/>
+          <a:lstStyle/>
+          <a:p>
+            <a:endParaRPr lang="en-US" dirty="0"/>
+          </a:p>
+        </p:txBody>
+      </p:sp>
+    </p:spTree>
+    <p:extLst>
+      <p:ext uri="{BB962C8B-B14F-4D97-AF65-F5344CB8AC3E}">
+        <p14:creationId xmlns:p14="http://schemas.microsoft.com/office/powerpoint/2010/main" val="2762439058"/>
       </p:ext>
     </p:extLst>
   </p:cSld>
@@ -4271,6 +4792,13 @@
   <p:clrMapOvr>
     <a:masterClrMapping/>
   </p:clrMapOvr>
+  <p:timing>
+    <p:tnLst>
+      <p:par>
+        <p:cTn xmlns:p14="http://schemas.microsoft.com/office/powerpoint/2010/main" id="1" dur="indefinite" restart="never" nodeType="tmRoot"/>
+      </p:par>
+    </p:tnLst>
+  </p:timing>
 </p:sld>
 </file>
 
@@ -5157,6 +5685,13 @@
   <p:clrMapOvr>
     <a:masterClrMapping/>
   </p:clrMapOvr>
+  <p:timing>
+    <p:tnLst>
+      <p:par>
+        <p:cTn xmlns:p14="http://schemas.microsoft.com/office/powerpoint/2010/main" id="1" dur="indefinite" restart="never" nodeType="tmRoot"/>
+      </p:par>
+    </p:tnLst>
+  </p:timing>
 </p:sld>
 </file>
 
@@ -5210,7 +5745,7 @@
       </p:sp>
       <p:sp>
         <p:nvSpPr>
-          <p:cNvPr id="4" name="Rounded Rectangle 3"/>
+          <p:cNvPr id="70" name="Rounded Rectangle 69"/>
           <p:cNvSpPr/>
           <p:nvPr/>
         </p:nvSpPr>
@@ -5267,7 +5802,7 @@
       </p:sp>
       <p:sp>
         <p:nvSpPr>
-          <p:cNvPr id="6" name="Rounded Rectangle 5"/>
+          <p:cNvPr id="71" name="Rounded Rectangle 70"/>
           <p:cNvSpPr/>
           <p:nvPr/>
         </p:nvSpPr>
@@ -5324,7 +5859,7 @@
       </p:sp>
       <p:sp>
         <p:nvSpPr>
-          <p:cNvPr id="7" name="Rounded Rectangle 6"/>
+          <p:cNvPr id="72" name="Rounded Rectangle 71"/>
           <p:cNvSpPr/>
           <p:nvPr/>
         </p:nvSpPr>
@@ -5381,7 +5916,7 @@
       </p:sp>
       <p:sp>
         <p:nvSpPr>
-          <p:cNvPr id="8" name="Rounded Rectangle 7"/>
+          <p:cNvPr id="73" name="Rounded Rectangle 72"/>
           <p:cNvSpPr/>
           <p:nvPr/>
         </p:nvSpPr>
@@ -5426,7 +5961,7 @@
                   <a:schemeClr val="tx1"/>
                 </a:solidFill>
               </a:rPr>
-              <a:t>Optical Flow</a:t>
+              <a:t>Differential method</a:t>
             </a:r>
             <a:endParaRPr lang="en-US" b="1" dirty="0">
               <a:solidFill>
@@ -5438,7 +5973,7 @@
       </p:sp>
       <p:pic>
         <p:nvPicPr>
-          <p:cNvPr id="10" name="Picture 9" descr="frame10.png"/>
+          <p:cNvPr id="74" name="Picture 73" descr="frame10.png"/>
           <p:cNvPicPr>
             <a:picLocks noChangeAspect="1"/>
           </p:cNvPicPr>
@@ -5482,7 +6017,7 @@
       </p:pic>
       <p:pic>
         <p:nvPicPr>
-          <p:cNvPr id="11" name="Picture 10" descr="frame11.png"/>
+          <p:cNvPr id="75" name="Picture 74" descr="frame11.png"/>
           <p:cNvPicPr>
             <a:picLocks noChangeAspect="1"/>
           </p:cNvPicPr>
@@ -5526,7 +6061,7 @@
       </p:pic>
       <p:cxnSp>
         <p:nvCxnSpPr>
-          <p:cNvPr id="13" name="Straight Arrow Connector 12"/>
+          <p:cNvPr id="76" name="Straight Arrow Connector 75"/>
           <p:cNvCxnSpPr/>
           <p:nvPr/>
         </p:nvCxnSpPr>
@@ -5562,7 +6097,7 @@
       </p:cxnSp>
       <p:cxnSp>
         <p:nvCxnSpPr>
-          <p:cNvPr id="14" name="Straight Arrow Connector 13"/>
+          <p:cNvPr id="77" name="Straight Arrow Connector 76"/>
           <p:cNvCxnSpPr/>
           <p:nvPr/>
         </p:nvCxnSpPr>
@@ -5598,7 +6133,7 @@
       </p:cxnSp>
       <p:sp>
         <p:nvSpPr>
-          <p:cNvPr id="15" name="TextBox 14"/>
+          <p:cNvPr id="78" name="TextBox 77"/>
           <p:cNvSpPr txBox="1"/>
           <p:nvPr/>
         </p:nvSpPr>
@@ -5628,7 +6163,7 @@
       </p:sp>
       <p:sp>
         <p:nvSpPr>
-          <p:cNvPr id="16" name="TextBox 15"/>
+          <p:cNvPr id="79" name="TextBox 78"/>
           <p:cNvSpPr txBox="1"/>
           <p:nvPr/>
         </p:nvSpPr>
@@ -5658,7 +6193,7 @@
       </p:sp>
       <p:pic>
         <p:nvPicPr>
-          <p:cNvPr id="19" name="Picture 18"/>
+          <p:cNvPr id="80" name="Picture 79"/>
           <p:cNvPicPr>
             <a:picLocks noChangeAspect="1"/>
           </p:cNvPicPr>
@@ -5672,7 +6207,7 @@
         </p:blipFill>
         <p:spPr>
           <a:xfrm>
-            <a:off x="3598081" y="4613308"/>
+            <a:off x="3719842" y="4613308"/>
             <a:ext cx="1589863" cy="1179576"/>
           </a:xfrm>
           <a:prstGeom prst="rect">
@@ -5696,7 +6231,7 @@
       </p:pic>
       <p:pic>
         <p:nvPicPr>
-          <p:cNvPr id="20" name="Picture 19"/>
+          <p:cNvPr id="81" name="Picture 80"/>
           <p:cNvPicPr>
             <a:picLocks noChangeAspect="1"/>
           </p:cNvPicPr>
@@ -5710,7 +6245,7 @@
         </p:blipFill>
         <p:spPr>
           <a:xfrm>
-            <a:off x="3512759" y="2306402"/>
+            <a:off x="3512759" y="2385233"/>
             <a:ext cx="1608513" cy="1179576"/>
           </a:xfrm>
           <a:prstGeom prst="rect">
@@ -5734,7 +6269,7 @@
       </p:pic>
       <p:cxnSp>
         <p:nvCxnSpPr>
-          <p:cNvPr id="21" name="Straight Arrow Connector 20"/>
+          <p:cNvPr id="82" name="Straight Arrow Connector 81"/>
           <p:cNvCxnSpPr/>
           <p:nvPr/>
         </p:nvCxnSpPr>
@@ -5770,7 +6305,7 @@
       </p:cxnSp>
       <p:cxnSp>
         <p:nvCxnSpPr>
-          <p:cNvPr id="36" name="Straight Arrow Connector 35"/>
+          <p:cNvPr id="83" name="Straight Arrow Connector 82"/>
           <p:cNvCxnSpPr/>
           <p:nvPr/>
         </p:nvCxnSpPr>
@@ -5806,7 +6341,7 @@
       </p:cxnSp>
       <p:cxnSp>
         <p:nvCxnSpPr>
-          <p:cNvPr id="42" name="Straight Connector 41"/>
+          <p:cNvPr id="84" name="Straight Connector 83"/>
           <p:cNvCxnSpPr/>
           <p:nvPr/>
         </p:nvCxnSpPr>
@@ -5841,7 +6376,7 @@
       </p:cxnSp>
       <p:cxnSp>
         <p:nvCxnSpPr>
-          <p:cNvPr id="44" name="Straight Arrow Connector 43"/>
+          <p:cNvPr id="85" name="Straight Arrow Connector 84"/>
           <p:cNvCxnSpPr/>
           <p:nvPr/>
         </p:nvCxnSpPr>
@@ -5877,7 +6412,7 @@
       </p:cxnSp>
       <p:cxnSp>
         <p:nvCxnSpPr>
-          <p:cNvPr id="48" name="Straight Connector 47"/>
+          <p:cNvPr id="86" name="Straight Connector 85"/>
           <p:cNvCxnSpPr/>
           <p:nvPr/>
         </p:nvCxnSpPr>
@@ -5912,7 +6447,7 @@
       </p:cxnSp>
       <p:cxnSp>
         <p:nvCxnSpPr>
-          <p:cNvPr id="50" name="Straight Arrow Connector 49"/>
+          <p:cNvPr id="87" name="Straight Arrow Connector 86"/>
           <p:cNvCxnSpPr/>
           <p:nvPr/>
         </p:nvCxnSpPr>
@@ -5948,7 +6483,7 @@
       </p:cxnSp>
       <p:cxnSp>
         <p:nvCxnSpPr>
-          <p:cNvPr id="51" name="Straight Connector 50"/>
+          <p:cNvPr id="88" name="Straight Connector 87"/>
           <p:cNvCxnSpPr/>
           <p:nvPr/>
         </p:nvCxnSpPr>
@@ -5983,7 +6518,7 @@
       </p:cxnSp>
       <p:cxnSp>
         <p:nvCxnSpPr>
-          <p:cNvPr id="52" name="Straight Connector 51"/>
+          <p:cNvPr id="89" name="Straight Connector 88"/>
           <p:cNvCxnSpPr/>
           <p:nvPr/>
         </p:nvCxnSpPr>
@@ -6018,7 +6553,7 @@
       </p:cxnSp>
       <p:cxnSp>
         <p:nvCxnSpPr>
-          <p:cNvPr id="55" name="Straight Arrow Connector 54"/>
+          <p:cNvPr id="90" name="Straight Arrow Connector 89"/>
           <p:cNvCxnSpPr/>
           <p:nvPr/>
         </p:nvCxnSpPr>
@@ -6054,7 +6589,7 @@
       </p:cxnSp>
       <p:cxnSp>
         <p:nvCxnSpPr>
-          <p:cNvPr id="57" name="Straight Connector 56"/>
+          <p:cNvPr id="91" name="Straight Connector 90"/>
           <p:cNvCxnSpPr/>
           <p:nvPr/>
         </p:nvCxnSpPr>
@@ -6089,7 +6624,7 @@
       </p:cxnSp>
       <p:pic>
         <p:nvPicPr>
-          <p:cNvPr id="60" name="Picture 59"/>
+          <p:cNvPr id="92" name="Picture 91"/>
           <p:cNvPicPr>
             <a:picLocks noChangeAspect="1"/>
           </p:cNvPicPr>
@@ -6127,7 +6662,7 @@
       </p:pic>
       <p:sp>
         <p:nvSpPr>
-          <p:cNvPr id="63" name="Plus 62"/>
+          <p:cNvPr id="93" name="Plus 92"/>
           <p:cNvSpPr/>
           <p:nvPr/>
         </p:nvSpPr>
@@ -6173,7 +6708,7 @@
       </p:sp>
       <p:cxnSp>
         <p:nvCxnSpPr>
-          <p:cNvPr id="64" name="Straight Arrow Connector 63"/>
+          <p:cNvPr id="94" name="Straight Arrow Connector 93"/>
           <p:cNvCxnSpPr/>
           <p:nvPr/>
         </p:nvCxnSpPr>
@@ -6209,7 +6744,7 @@
       </p:cxnSp>
       <p:cxnSp>
         <p:nvCxnSpPr>
-          <p:cNvPr id="65" name="Straight Arrow Connector 64"/>
+          <p:cNvPr id="95" name="Straight Arrow Connector 94"/>
           <p:cNvCxnSpPr/>
           <p:nvPr/>
         </p:nvCxnSpPr>
@@ -6245,14 +6780,14 @@
       </p:cxnSp>
       <p:cxnSp>
         <p:nvCxnSpPr>
-          <p:cNvPr id="67" name="Straight Arrow Connector 66"/>
+          <p:cNvPr id="96" name="Straight Arrow Connector 95"/>
           <p:cNvCxnSpPr/>
           <p:nvPr/>
         </p:nvCxnSpPr>
         <p:spPr>
           <a:xfrm>
-            <a:off x="8280400" y="4176374"/>
-            <a:ext cx="0" cy="519806"/>
+            <a:off x="8391853" y="4027166"/>
+            <a:ext cx="576975" cy="0"/>
           </a:xfrm>
           <a:prstGeom prst="straightConnector1">
             <a:avLst/>
@@ -6262,6 +6797,115 @@
               <a:srgbClr val="0000FF"/>
             </a:solidFill>
             <a:tailEnd type="arrow"/>
+          </a:ln>
+        </p:spPr>
+        <p:style>
+          <a:lnRef idx="2">
+            <a:schemeClr val="accent1"/>
+          </a:lnRef>
+          <a:fillRef idx="0">
+            <a:schemeClr val="accent1"/>
+          </a:fillRef>
+          <a:effectRef idx="1">
+            <a:schemeClr val="accent1"/>
+          </a:effectRef>
+          <a:fontRef idx="minor">
+            <a:schemeClr val="tx1"/>
+          </a:fontRef>
+        </p:style>
+      </p:cxnSp>
+      <p:cxnSp>
+        <p:nvCxnSpPr>
+          <p:cNvPr id="97" name="Straight Connector 96"/>
+          <p:cNvCxnSpPr>
+            <a:stCxn id="80" idx="0"/>
+          </p:cNvCxnSpPr>
+          <p:nvPr/>
+        </p:nvCxnSpPr>
+        <p:spPr>
+          <a:xfrm flipV="1">
+            <a:off x="4514774" y="4051890"/>
+            <a:ext cx="0" cy="561418"/>
+          </a:xfrm>
+          <a:prstGeom prst="line">
+            <a:avLst/>
+          </a:prstGeom>
+          <a:ln>
+            <a:solidFill>
+              <a:schemeClr val="tx1"/>
+            </a:solidFill>
+          </a:ln>
+        </p:spPr>
+        <p:style>
+          <a:lnRef idx="2">
+            <a:schemeClr val="accent1"/>
+          </a:lnRef>
+          <a:fillRef idx="0">
+            <a:schemeClr val="accent1"/>
+          </a:fillRef>
+          <a:effectRef idx="1">
+            <a:schemeClr val="accent1"/>
+          </a:effectRef>
+          <a:fontRef idx="minor">
+            <a:schemeClr val="tx1"/>
+          </a:fontRef>
+        </p:style>
+      </p:cxnSp>
+      <p:cxnSp>
+        <p:nvCxnSpPr>
+          <p:cNvPr id="98" name="Straight Connector 97"/>
+          <p:cNvCxnSpPr>
+            <a:endCxn id="81" idx="3"/>
+          </p:cNvCxnSpPr>
+          <p:nvPr/>
+        </p:nvCxnSpPr>
+        <p:spPr>
+          <a:xfrm flipH="1">
+            <a:off x="5121272" y="2971800"/>
+            <a:ext cx="249744" cy="3221"/>
+          </a:xfrm>
+          <a:prstGeom prst="line">
+            <a:avLst/>
+          </a:prstGeom>
+          <a:ln>
+            <a:solidFill>
+              <a:schemeClr val="tx1"/>
+            </a:solidFill>
+          </a:ln>
+        </p:spPr>
+        <p:style>
+          <a:lnRef idx="2">
+            <a:schemeClr val="accent1"/>
+          </a:lnRef>
+          <a:fillRef idx="0">
+            <a:schemeClr val="accent1"/>
+          </a:fillRef>
+          <a:effectRef idx="1">
+            <a:schemeClr val="accent1"/>
+          </a:effectRef>
+          <a:fontRef idx="minor">
+            <a:schemeClr val="tx1"/>
+          </a:fontRef>
+        </p:style>
+      </p:cxnSp>
+      <p:cxnSp>
+        <p:nvCxnSpPr>
+          <p:cNvPr id="99" name="Straight Connector 98"/>
+          <p:cNvCxnSpPr/>
+          <p:nvPr/>
+        </p:nvCxnSpPr>
+        <p:spPr>
+          <a:xfrm flipV="1">
+            <a:off x="8652347" y="4027166"/>
+            <a:ext cx="0" cy="675042"/>
+          </a:xfrm>
+          <a:prstGeom prst="line">
+            <a:avLst/>
+          </a:prstGeom>
+          <a:ln>
+            <a:solidFill>
+              <a:schemeClr val="tx1"/>
+            </a:solidFill>
           </a:ln>
         </p:spPr>
         <p:style>
@@ -6446,7 +7090,7 @@
                   <a:srgbClr val="0000FF"/>
                 </a:solidFill>
               </a:rPr>
-              <a:t>Results </a:t>
+              <a:t>Setup</a:t>
             </a:r>
             <a:endParaRPr lang="en-US" b="1" dirty="0">
               <a:solidFill>
@@ -6456,1438 +7100,87 @@
           </a:p>
         </p:txBody>
       </p:sp>
-      <p:graphicFrame>
-        <p:nvGraphicFramePr>
-          <p:cNvPr id="4" name="Content Placeholder 3"/>
-          <p:cNvGraphicFramePr>
-            <a:graphicFrameLocks noGrp="1"/>
-          </p:cNvGraphicFramePr>
+      <p:sp>
+        <p:nvSpPr>
+          <p:cNvPr id="3" name="Content Placeholder 2"/>
+          <p:cNvSpPr>
+            <a:spLocks noGrp="1"/>
+          </p:cNvSpPr>
           <p:nvPr>
             <p:ph idx="1"/>
-            <p:extLst>
-              <p:ext uri="{D42A27DB-BD31-4B8C-83A1-F6EECF244321}">
-                <p14:modId xmlns:p14="http://schemas.microsoft.com/office/powerpoint/2010/main" val="1593393614"/>
-              </p:ext>
-            </p:extLst>
           </p:nvPr>
-        </p:nvGraphicFramePr>
-        <p:xfrm>
-          <a:off x="457200" y="1600200"/>
-          <a:ext cx="8229600" cy="4267200"/>
-        </p:xfrm>
-        <a:graphic>
-          <a:graphicData uri="http://schemas.openxmlformats.org/drawingml/2006/table">
-            <a:tbl>
-              <a:tblPr firstRow="1" bandRow="1">
-                <a:tableStyleId>{073A0DAA-6AF3-43AB-8588-CEC1D06C72B9}</a:tableStyleId>
-              </a:tblPr>
-              <a:tblGrid>
-                <a:gridCol w="1727979"/>
-                <a:gridCol w="1083055"/>
-                <a:gridCol w="1083056"/>
-                <a:gridCol w="1083055"/>
-                <a:gridCol w="1084152"/>
-                <a:gridCol w="1084151"/>
-                <a:gridCol w="1084152"/>
-              </a:tblGrid>
-              <a:tr h="370840">
-                <a:tc>
-                  <a:txBody>
-                    <a:bodyPr/>
-                    <a:lstStyle/>
-                    <a:p>
-                      <a:endParaRPr lang="en-US" sz="2000" dirty="0"/>
-                    </a:p>
-                  </a:txBody>
-                  <a:tcPr anchor="ctr"/>
-                </a:tc>
-                <a:tc gridSpan="3">
-                  <a:txBody>
-                    <a:bodyPr/>
-                    <a:lstStyle/>
-                    <a:p>
-                      <a:pPr marL="0" indent="0" algn="ctr">
-                        <a:buFont typeface="+mj-lt"/>
-                        <a:buNone/>
-                      </a:pPr>
-                      <a:r>
-                        <a:rPr lang="en-US" sz="2000" dirty="0" smtClean="0"/>
-                        <a:t>Our Method Without</a:t>
-                      </a:r>
-                      <a:r>
-                        <a:rPr lang="en-US" sz="2000" baseline="0" dirty="0" smtClean="0"/>
-                        <a:t> </a:t>
-                      </a:r>
-                      <a:r>
-                        <a:rPr lang="en-US" sz="2000" dirty="0" smtClean="0"/>
-                        <a:t>Weighted Median</a:t>
-                      </a:r>
-                      <a:endParaRPr lang="en-US" sz="2000" dirty="0"/>
-                    </a:p>
-                  </a:txBody>
-                  <a:tcPr anchor="ctr"/>
-                </a:tc>
-                <a:tc hMerge="1">
-                  <a:txBody>
-                    <a:bodyPr/>
-                    <a:lstStyle/>
-                    <a:p>
-                      <a:endParaRPr lang="en-US"/>
-                    </a:p>
-                  </a:txBody>
-                  <a:tcPr/>
-                </a:tc>
-                <a:tc hMerge="1">
-                  <a:txBody>
-                    <a:bodyPr/>
-                    <a:lstStyle/>
-                    <a:p>
-                      <a:endParaRPr lang="en-US"/>
-                    </a:p>
-                  </a:txBody>
-                  <a:tcPr/>
-                </a:tc>
-                <a:tc gridSpan="3">
-                  <a:txBody>
-                    <a:bodyPr/>
-                    <a:lstStyle/>
-                    <a:p>
-                      <a:pPr marL="0" indent="0" algn="ctr">
-                        <a:buFont typeface="+mj-lt"/>
-                        <a:buNone/>
-                      </a:pPr>
-                      <a:r>
-                        <a:rPr lang="en-US" sz="2000" dirty="0" smtClean="0"/>
-                        <a:t>Classic++</a:t>
-                      </a:r>
-                      <a:endParaRPr lang="en-US" sz="2000" dirty="0"/>
-                    </a:p>
-                  </a:txBody>
-                  <a:tcPr anchor="ctr"/>
-                </a:tc>
-                <a:tc hMerge="1">
-                  <a:txBody>
-                    <a:bodyPr/>
-                    <a:lstStyle/>
-                    <a:p>
-                      <a:endParaRPr lang="en-US"/>
-                    </a:p>
-                  </a:txBody>
-                  <a:tcPr/>
-                </a:tc>
-                <a:tc hMerge="1">
-                  <a:txBody>
-                    <a:bodyPr/>
-                    <a:lstStyle/>
-                    <a:p>
-                      <a:endParaRPr lang="en-US"/>
-                    </a:p>
-                  </a:txBody>
-                  <a:tcPr/>
-                </a:tc>
-              </a:tr>
-              <a:tr h="370840">
-                <a:tc>
-                  <a:txBody>
-                    <a:bodyPr/>
-                    <a:lstStyle/>
-                    <a:p>
-                      <a:pPr algn="ctr"/>
-                      <a:r>
-                        <a:rPr lang="en-US" sz="2000" b="1" dirty="0" smtClean="0"/>
-                        <a:t>Name</a:t>
-                      </a:r>
-                      <a:endParaRPr lang="en-US" sz="2000" b="1" dirty="0"/>
-                    </a:p>
-                  </a:txBody>
-                  <a:tcPr/>
-                </a:tc>
-                <a:tc>
-                  <a:txBody>
-                    <a:bodyPr/>
-                    <a:lstStyle/>
-                    <a:p>
-                      <a:pPr algn="ctr"/>
-                      <a:r>
-                        <a:rPr lang="en-US" sz="2000" b="1" dirty="0" smtClean="0"/>
-                        <a:t>Time</a:t>
-                      </a:r>
-                      <a:endParaRPr lang="en-US" sz="2000" b="1" dirty="0"/>
-                    </a:p>
-                  </a:txBody>
-                  <a:tcPr/>
-                </a:tc>
-                <a:tc>
-                  <a:txBody>
-                    <a:bodyPr/>
-                    <a:lstStyle/>
-                    <a:p>
-                      <a:pPr algn="ctr"/>
-                      <a:r>
-                        <a:rPr lang="en-US" sz="2000" b="1" dirty="0" smtClean="0"/>
-                        <a:t>AAE</a:t>
-                      </a:r>
-                      <a:endParaRPr lang="en-US" sz="2000" b="1" dirty="0"/>
-                    </a:p>
-                  </a:txBody>
-                  <a:tcPr/>
-                </a:tc>
-                <a:tc>
-                  <a:txBody>
-                    <a:bodyPr/>
-                    <a:lstStyle/>
-                    <a:p>
-                      <a:pPr algn="ctr"/>
-                      <a:r>
-                        <a:rPr lang="en-US" sz="2000" b="1" dirty="0" smtClean="0"/>
-                        <a:t>AEP</a:t>
-                      </a:r>
-                      <a:endParaRPr lang="en-US" sz="2000" b="1" dirty="0"/>
-                    </a:p>
-                  </a:txBody>
-                  <a:tcPr/>
-                </a:tc>
-                <a:tc>
-                  <a:txBody>
-                    <a:bodyPr/>
-                    <a:lstStyle/>
-                    <a:p>
-                      <a:pPr algn="ctr"/>
-                      <a:r>
-                        <a:rPr lang="en-US" sz="2000" b="1" dirty="0" smtClean="0"/>
-                        <a:t>Time</a:t>
-                      </a:r>
-                      <a:endParaRPr lang="en-US" sz="2000" b="1" dirty="0"/>
-                    </a:p>
-                  </a:txBody>
-                  <a:tcPr/>
-                </a:tc>
-                <a:tc>
-                  <a:txBody>
-                    <a:bodyPr/>
-                    <a:lstStyle/>
-                    <a:p>
-                      <a:pPr algn="ctr"/>
-                      <a:r>
-                        <a:rPr lang="en-US" sz="2000" b="1" dirty="0" smtClean="0"/>
-                        <a:t>AAE</a:t>
-                      </a:r>
-                      <a:endParaRPr lang="en-US" sz="2000" b="1" dirty="0"/>
-                    </a:p>
-                  </a:txBody>
-                  <a:tcPr/>
-                </a:tc>
-                <a:tc>
-                  <a:txBody>
-                    <a:bodyPr/>
-                    <a:lstStyle/>
-                    <a:p>
-                      <a:pPr algn="ctr"/>
-                      <a:r>
-                        <a:rPr lang="en-US" sz="2000" b="1" dirty="0" smtClean="0"/>
-                        <a:t>AEP</a:t>
-                      </a:r>
-                      <a:endParaRPr lang="en-US" sz="2000" b="1" dirty="0"/>
-                    </a:p>
-                  </a:txBody>
-                  <a:tcPr/>
-                </a:tc>
-              </a:tr>
-              <a:tr h="370840">
-                <a:tc>
-                  <a:txBody>
-                    <a:bodyPr/>
-                    <a:lstStyle/>
-                    <a:p>
-                      <a:pPr algn="ctr" fontAlgn="b"/>
-                      <a:r>
-                        <a:rPr lang="en-US" sz="2000" b="0" i="0" u="none" strike="noStrike" dirty="0" err="1">
-                          <a:solidFill>
-                            <a:srgbClr val="000000"/>
-                          </a:solidFill>
-                          <a:effectLst/>
-                          <a:latin typeface="Calibri"/>
-                        </a:rPr>
-                        <a:t>Dimetrodon</a:t>
-                      </a:r>
-                      <a:r>
-                        <a:rPr lang="en-US" sz="2000" b="0" i="0" u="none" strike="noStrike" dirty="0">
-                          <a:solidFill>
-                            <a:srgbClr val="000000"/>
-                          </a:solidFill>
-                          <a:effectLst/>
-                          <a:latin typeface="Calibri"/>
-                        </a:rPr>
-                        <a:t> </a:t>
-                      </a:r>
-                    </a:p>
-                  </a:txBody>
-                  <a:tcPr marL="12700" marR="12700" marT="12700" marB="0" anchor="b"/>
-                </a:tc>
-                <a:tc>
-                  <a:txBody>
-                    <a:bodyPr/>
-                    <a:lstStyle/>
-                    <a:p>
-                      <a:pPr algn="ctr"/>
-                      <a:r>
-                        <a:rPr lang="en-US" sz="2000" dirty="0" smtClean="0"/>
-                        <a:t>92</a:t>
-                      </a:r>
-                      <a:endParaRPr lang="en-US" sz="2000" dirty="0"/>
-                    </a:p>
-                  </a:txBody>
-                  <a:tcPr/>
-                </a:tc>
-                <a:tc>
-                  <a:txBody>
-                    <a:bodyPr/>
-                    <a:lstStyle/>
-                    <a:p>
-                      <a:pPr algn="ctr"/>
-                      <a:r>
-                        <a:rPr lang="en-US" sz="2000" dirty="0" smtClean="0"/>
-                        <a:t>8.0</a:t>
-                      </a:r>
-                      <a:endParaRPr lang="en-US" sz="2000" dirty="0"/>
-                    </a:p>
-                  </a:txBody>
-                  <a:tcPr/>
-                </a:tc>
-                <a:tc>
-                  <a:txBody>
-                    <a:bodyPr/>
-                    <a:lstStyle/>
-                    <a:p>
-                      <a:pPr algn="ctr"/>
-                      <a:endParaRPr lang="en-US" sz="2000" dirty="0"/>
-                    </a:p>
-                  </a:txBody>
-                  <a:tcPr/>
-                </a:tc>
-                <a:tc>
-                  <a:txBody>
-                    <a:bodyPr/>
-                    <a:lstStyle/>
-                    <a:p>
-                      <a:pPr algn="ctr" fontAlgn="b"/>
-                      <a:r>
-                        <a:rPr lang="en-US" sz="2000" b="0" i="0" u="none" strike="noStrike" dirty="0" smtClean="0">
-                          <a:solidFill>
-                            <a:srgbClr val="000000"/>
-                          </a:solidFill>
-                          <a:effectLst/>
-                          <a:latin typeface="Calibri"/>
-                        </a:rPr>
-                        <a:t>215</a:t>
-                      </a:r>
-                      <a:endParaRPr lang="en-US" sz="2000" b="0" i="0" u="none" strike="noStrike" dirty="0">
-                        <a:solidFill>
-                          <a:srgbClr val="000000"/>
-                        </a:solidFill>
-                        <a:effectLst/>
-                        <a:latin typeface="Calibri"/>
-                      </a:endParaRPr>
-                    </a:p>
-                  </a:txBody>
-                  <a:tcPr marL="12700" marR="12700" marT="12700" marB="0" anchor="b"/>
-                </a:tc>
-                <a:tc>
-                  <a:txBody>
-                    <a:bodyPr/>
-                    <a:lstStyle/>
-                    <a:p>
-                      <a:pPr algn="ctr" fontAlgn="b"/>
-                      <a:r>
-                        <a:rPr lang="en-US" sz="2000" b="0" i="0" u="none" strike="noStrike" dirty="0" smtClean="0">
-                          <a:solidFill>
-                            <a:srgbClr val="000000"/>
-                          </a:solidFill>
-                          <a:effectLst/>
-                          <a:latin typeface="Calibri"/>
-                        </a:rPr>
-                        <a:t>1.9</a:t>
-                      </a:r>
-                      <a:endParaRPr lang="en-US" sz="2000" b="0" i="0" u="none" strike="noStrike" dirty="0">
-                        <a:solidFill>
-                          <a:srgbClr val="000000"/>
-                        </a:solidFill>
-                        <a:effectLst/>
-                        <a:latin typeface="Calibri"/>
-                      </a:endParaRPr>
-                    </a:p>
-                  </a:txBody>
-                  <a:tcPr marL="12700" marR="12700" marT="12700" marB="0" anchor="b"/>
-                </a:tc>
-                <a:tc>
-                  <a:txBody>
-                    <a:bodyPr/>
-                    <a:lstStyle/>
-                    <a:p>
-                      <a:pPr algn="ctr" fontAlgn="b"/>
-                      <a:endParaRPr lang="en-US" sz="2000" b="0" i="0" u="none" strike="noStrike" dirty="0">
-                        <a:solidFill>
-                          <a:srgbClr val="000000"/>
-                        </a:solidFill>
-                        <a:effectLst/>
-                        <a:latin typeface="Calibri"/>
-                      </a:endParaRPr>
-                    </a:p>
-                  </a:txBody>
-                  <a:tcPr marL="12700" marR="12700" marT="12700" marB="0" anchor="b"/>
-                </a:tc>
-              </a:tr>
-              <a:tr h="370840">
-                <a:tc>
-                  <a:txBody>
-                    <a:bodyPr/>
-                    <a:lstStyle/>
-                    <a:p>
-                      <a:pPr algn="ctr" fontAlgn="b"/>
-                      <a:r>
-                        <a:rPr lang="en-US" sz="2000" b="0" i="0" u="none" strike="noStrike" dirty="0">
-                          <a:solidFill>
-                            <a:srgbClr val="000000"/>
-                          </a:solidFill>
-                          <a:effectLst/>
-                          <a:latin typeface="Calibri"/>
-                        </a:rPr>
-                        <a:t>Grove2</a:t>
-                      </a:r>
-                    </a:p>
-                  </a:txBody>
-                  <a:tcPr marL="12700" marR="12700" marT="12700" marB="0" anchor="b"/>
-                </a:tc>
-                <a:tc>
-                  <a:txBody>
-                    <a:bodyPr/>
-                    <a:lstStyle/>
-                    <a:p>
-                      <a:pPr algn="ctr"/>
-                      <a:r>
-                        <a:rPr lang="en-US" sz="2000" dirty="0" smtClean="0"/>
-                        <a:t>150</a:t>
-                      </a:r>
-                      <a:endParaRPr lang="en-US" sz="2000" dirty="0"/>
-                    </a:p>
-                  </a:txBody>
-                  <a:tcPr/>
-                </a:tc>
-                <a:tc>
-                  <a:txBody>
-                    <a:bodyPr/>
-                    <a:lstStyle/>
-                    <a:p>
-                      <a:pPr algn="ctr"/>
-                      <a:r>
-                        <a:rPr lang="en-US" sz="2000" dirty="0" smtClean="0"/>
-                        <a:t>5.6</a:t>
-                      </a:r>
-                      <a:endParaRPr lang="en-US" sz="2000" dirty="0"/>
-                    </a:p>
-                  </a:txBody>
-                  <a:tcPr/>
-                </a:tc>
-                <a:tc>
-                  <a:txBody>
-                    <a:bodyPr/>
-                    <a:lstStyle/>
-                    <a:p>
-                      <a:pPr algn="ctr"/>
-                      <a:r>
-                        <a:rPr lang="en-US" sz="2000" dirty="0" smtClean="0"/>
-                        <a:t>0.4</a:t>
-                      </a:r>
-                      <a:endParaRPr lang="en-US" sz="2000" dirty="0"/>
-                    </a:p>
-                  </a:txBody>
-                  <a:tcPr/>
-                </a:tc>
-                <a:tc>
-                  <a:txBody>
-                    <a:bodyPr/>
-                    <a:lstStyle/>
-                    <a:p>
-                      <a:pPr algn="ctr" fontAlgn="b"/>
-                      <a:r>
-                        <a:rPr lang="en-US" sz="2000" b="0" i="0" u="none" strike="noStrike" dirty="0" smtClean="0">
-                          <a:solidFill>
-                            <a:srgbClr val="000000"/>
-                          </a:solidFill>
-                          <a:effectLst/>
-                          <a:latin typeface="Calibri"/>
-                        </a:rPr>
-                        <a:t>316</a:t>
-                      </a:r>
-                      <a:endParaRPr lang="en-US" sz="2000" b="0" i="0" u="none" strike="noStrike" dirty="0">
-                        <a:solidFill>
-                          <a:srgbClr val="000000"/>
-                        </a:solidFill>
-                        <a:effectLst/>
-                        <a:latin typeface="Calibri"/>
-                      </a:endParaRPr>
-                    </a:p>
-                  </a:txBody>
-                  <a:tcPr marL="12700" marR="12700" marT="12700" marB="0" anchor="b"/>
-                </a:tc>
-                <a:tc>
-                  <a:txBody>
-                    <a:bodyPr/>
-                    <a:lstStyle/>
-                    <a:p>
-                      <a:pPr algn="ctr" fontAlgn="b"/>
-                      <a:r>
-                        <a:rPr lang="en-US" sz="2000" b="0" i="0" u="none" strike="noStrike" dirty="0" smtClean="0">
-                          <a:solidFill>
-                            <a:srgbClr val="000000"/>
-                          </a:solidFill>
-                          <a:effectLst/>
-                          <a:latin typeface="Calibri"/>
-                        </a:rPr>
-                        <a:t>2.2</a:t>
-                      </a:r>
-                      <a:endParaRPr lang="en-US" sz="2000" b="0" i="0" u="none" strike="noStrike" dirty="0">
-                        <a:solidFill>
-                          <a:srgbClr val="000000"/>
-                        </a:solidFill>
-                        <a:effectLst/>
-                        <a:latin typeface="Calibri"/>
-                      </a:endParaRPr>
-                    </a:p>
-                  </a:txBody>
-                  <a:tcPr marL="12700" marR="12700" marT="12700" marB="0" anchor="b"/>
-                </a:tc>
-                <a:tc>
-                  <a:txBody>
-                    <a:bodyPr/>
-                    <a:lstStyle/>
-                    <a:p>
-                      <a:pPr algn="ctr" fontAlgn="b"/>
-                      <a:r>
-                        <a:rPr lang="en-US" sz="2000" b="0" i="0" u="none" strike="noStrike" dirty="0">
-                          <a:solidFill>
-                            <a:srgbClr val="000000"/>
-                          </a:solidFill>
-                          <a:effectLst/>
-                          <a:latin typeface="Calibri"/>
-                        </a:rPr>
-                        <a:t>0.149</a:t>
-                      </a:r>
-                    </a:p>
-                  </a:txBody>
-                  <a:tcPr marL="12700" marR="12700" marT="12700" marB="0" anchor="b"/>
-                </a:tc>
-              </a:tr>
-              <a:tr h="370840">
-                <a:tc>
-                  <a:txBody>
-                    <a:bodyPr/>
-                    <a:lstStyle/>
-                    <a:p>
-                      <a:pPr algn="ctr" fontAlgn="b"/>
-                      <a:r>
-                        <a:rPr lang="en-US" sz="2000" b="0" i="0" u="none" strike="noStrike" dirty="0">
-                          <a:solidFill>
-                            <a:srgbClr val="000000"/>
-                          </a:solidFill>
-                          <a:effectLst/>
-                          <a:latin typeface="Calibri"/>
-                        </a:rPr>
-                        <a:t>Grove3</a:t>
-                      </a:r>
-                    </a:p>
-                  </a:txBody>
-                  <a:tcPr marL="12700" marR="12700" marT="12700" marB="0" anchor="b"/>
-                </a:tc>
-                <a:tc>
-                  <a:txBody>
-                    <a:bodyPr/>
-                    <a:lstStyle/>
-                    <a:p>
-                      <a:pPr algn="ctr"/>
-                      <a:r>
-                        <a:rPr lang="en-US" sz="2000" dirty="0" smtClean="0"/>
-                        <a:t>152</a:t>
-                      </a:r>
-                      <a:endParaRPr lang="en-US" sz="2000" dirty="0"/>
-                    </a:p>
-                  </a:txBody>
-                  <a:tcPr/>
-                </a:tc>
-                <a:tc>
-                  <a:txBody>
-                    <a:bodyPr/>
-                    <a:lstStyle/>
-                    <a:p>
-                      <a:pPr algn="ctr"/>
-                      <a:r>
-                        <a:rPr lang="en-US" sz="2000" dirty="0" smtClean="0"/>
-                        <a:t>11.6</a:t>
-                      </a:r>
-                      <a:endParaRPr lang="en-US" sz="2000" dirty="0"/>
-                    </a:p>
-                  </a:txBody>
-                  <a:tcPr/>
-                </a:tc>
-                <a:tc>
-                  <a:txBody>
-                    <a:bodyPr/>
-                    <a:lstStyle/>
-                    <a:p>
-                      <a:pPr algn="ctr"/>
-                      <a:r>
-                        <a:rPr lang="en-US" sz="2000" dirty="0" smtClean="0"/>
-                        <a:t>1.1</a:t>
-                      </a:r>
-                      <a:endParaRPr lang="en-US" sz="2000" dirty="0"/>
-                    </a:p>
-                  </a:txBody>
-                  <a:tcPr/>
-                </a:tc>
-                <a:tc>
-                  <a:txBody>
-                    <a:bodyPr/>
-                    <a:lstStyle/>
-                    <a:p>
-                      <a:pPr algn="ctr" fontAlgn="b"/>
-                      <a:r>
-                        <a:rPr lang="en-US" sz="2000" b="0" i="0" u="none" strike="noStrike" dirty="0" smtClean="0">
-                          <a:solidFill>
-                            <a:srgbClr val="000000"/>
-                          </a:solidFill>
-                          <a:effectLst/>
-                          <a:latin typeface="Calibri"/>
-                        </a:rPr>
-                        <a:t>312</a:t>
-                      </a:r>
-                      <a:endParaRPr lang="en-US" sz="2000" b="0" i="0" u="none" strike="noStrike" dirty="0">
-                        <a:solidFill>
-                          <a:srgbClr val="000000"/>
-                        </a:solidFill>
-                        <a:effectLst/>
-                        <a:latin typeface="Calibri"/>
-                      </a:endParaRPr>
-                    </a:p>
-                  </a:txBody>
-                  <a:tcPr marL="12700" marR="12700" marT="12700" marB="0" anchor="b"/>
-                </a:tc>
-                <a:tc>
-                  <a:txBody>
-                    <a:bodyPr/>
-                    <a:lstStyle/>
-                    <a:p>
-                      <a:pPr algn="ctr" fontAlgn="b"/>
-                      <a:r>
-                        <a:rPr lang="en-US" sz="2000" b="0" i="0" u="none" strike="noStrike" dirty="0" smtClean="0">
-                          <a:solidFill>
-                            <a:srgbClr val="000000"/>
-                          </a:solidFill>
-                          <a:effectLst/>
-                          <a:latin typeface="Calibri"/>
-                        </a:rPr>
-                        <a:t>6.3</a:t>
-                      </a:r>
-                      <a:endParaRPr lang="en-US" sz="2000" b="0" i="0" u="none" strike="noStrike" dirty="0">
-                        <a:solidFill>
-                          <a:srgbClr val="000000"/>
-                        </a:solidFill>
-                        <a:effectLst/>
-                        <a:latin typeface="Calibri"/>
-                      </a:endParaRPr>
-                    </a:p>
-                  </a:txBody>
-                  <a:tcPr marL="12700" marR="12700" marT="12700" marB="0" anchor="b"/>
-                </a:tc>
-                <a:tc>
-                  <a:txBody>
-                    <a:bodyPr/>
-                    <a:lstStyle/>
-                    <a:p>
-                      <a:pPr algn="ctr" fontAlgn="b"/>
-                      <a:r>
-                        <a:rPr lang="en-US" sz="2000" b="0" i="0" u="none" strike="noStrike" dirty="0">
-                          <a:solidFill>
-                            <a:srgbClr val="000000"/>
-                          </a:solidFill>
-                          <a:effectLst/>
-                          <a:latin typeface="Calibri"/>
-                        </a:rPr>
-                        <a:t>0.662</a:t>
-                      </a:r>
-                    </a:p>
-                  </a:txBody>
-                  <a:tcPr marL="12700" marR="12700" marT="12700" marB="0" anchor="b"/>
-                </a:tc>
-              </a:tr>
-              <a:tr h="370840">
-                <a:tc>
-                  <a:txBody>
-                    <a:bodyPr/>
-                    <a:lstStyle/>
-                    <a:p>
-                      <a:pPr algn="ctr" fontAlgn="b"/>
-                      <a:r>
-                        <a:rPr lang="en-US" sz="2000" b="0" i="0" u="none" strike="noStrike" dirty="0">
-                          <a:solidFill>
-                            <a:srgbClr val="000000"/>
-                          </a:solidFill>
-                          <a:effectLst/>
-                          <a:latin typeface="Calibri"/>
-                        </a:rPr>
-                        <a:t>Hydrangea</a:t>
-                      </a:r>
-                    </a:p>
-                  </a:txBody>
-                  <a:tcPr marL="12700" marR="12700" marT="12700" marB="0" anchor="b"/>
-                </a:tc>
-                <a:tc>
-                  <a:txBody>
-                    <a:bodyPr/>
-                    <a:lstStyle/>
-                    <a:p>
-                      <a:pPr algn="ctr"/>
-                      <a:r>
-                        <a:rPr lang="en-US" sz="2000" dirty="0" smtClean="0"/>
-                        <a:t>93</a:t>
-                      </a:r>
-                      <a:endParaRPr lang="en-US" sz="2000" dirty="0"/>
-                    </a:p>
-                  </a:txBody>
-                  <a:tcPr/>
-                </a:tc>
-                <a:tc>
-                  <a:txBody>
-                    <a:bodyPr/>
-                    <a:lstStyle/>
-                    <a:p>
-                      <a:pPr algn="ctr"/>
-                      <a:r>
-                        <a:rPr lang="en-US" sz="2000" dirty="0" smtClean="0"/>
-                        <a:t>8.8</a:t>
-                      </a:r>
-                      <a:endParaRPr lang="en-US" sz="2000" dirty="0"/>
-                    </a:p>
-                  </a:txBody>
-                  <a:tcPr/>
-                </a:tc>
-                <a:tc>
-                  <a:txBody>
-                    <a:bodyPr/>
-                    <a:lstStyle/>
-                    <a:p>
-                      <a:pPr algn="ctr"/>
-                      <a:endParaRPr lang="en-US" sz="2000" dirty="0"/>
-                    </a:p>
-                  </a:txBody>
-                  <a:tcPr/>
-                </a:tc>
-                <a:tc>
-                  <a:txBody>
-                    <a:bodyPr/>
-                    <a:lstStyle/>
-                    <a:p>
-                      <a:pPr algn="ctr" fontAlgn="b"/>
-                      <a:r>
-                        <a:rPr lang="en-US" sz="2000" b="0" i="0" u="none" strike="noStrike" dirty="0" smtClean="0">
-                          <a:solidFill>
-                            <a:srgbClr val="000000"/>
-                          </a:solidFill>
-                          <a:effectLst/>
-                          <a:latin typeface="Calibri"/>
-                        </a:rPr>
-                        <a:t>217</a:t>
-                      </a:r>
-                      <a:endParaRPr lang="en-US" sz="2000" b="0" i="0" u="none" strike="noStrike" dirty="0">
-                        <a:solidFill>
-                          <a:srgbClr val="000000"/>
-                        </a:solidFill>
-                        <a:effectLst/>
-                        <a:latin typeface="Calibri"/>
-                      </a:endParaRPr>
-                    </a:p>
-                  </a:txBody>
-                  <a:tcPr marL="12700" marR="12700" marT="12700" marB="0" anchor="b"/>
-                </a:tc>
-                <a:tc>
-                  <a:txBody>
-                    <a:bodyPr/>
-                    <a:lstStyle/>
-                    <a:p>
-                      <a:pPr algn="ctr" fontAlgn="b"/>
-                      <a:r>
-                        <a:rPr lang="en-US" sz="2000" b="0" i="0" u="none" strike="noStrike" dirty="0" smtClean="0">
-                          <a:solidFill>
-                            <a:srgbClr val="000000"/>
-                          </a:solidFill>
-                          <a:effectLst/>
-                          <a:latin typeface="Calibri"/>
-                        </a:rPr>
-                        <a:t>6.8</a:t>
-                      </a:r>
-                      <a:endParaRPr lang="en-US" sz="2000" b="0" i="0" u="none" strike="noStrike" dirty="0">
-                        <a:solidFill>
-                          <a:srgbClr val="000000"/>
-                        </a:solidFill>
-                        <a:effectLst/>
-                        <a:latin typeface="Calibri"/>
-                      </a:endParaRPr>
-                    </a:p>
-                  </a:txBody>
-                  <a:tcPr marL="12700" marR="12700" marT="12700" marB="0" anchor="b"/>
-                </a:tc>
-                <a:tc>
-                  <a:txBody>
-                    <a:bodyPr/>
-                    <a:lstStyle/>
-                    <a:p>
-                      <a:pPr algn="ctr" fontAlgn="b"/>
-                      <a:endParaRPr lang="en-US" sz="2000" b="0" i="0" u="none" strike="noStrike" dirty="0">
-                        <a:solidFill>
-                          <a:srgbClr val="000000"/>
-                        </a:solidFill>
-                        <a:effectLst/>
-                        <a:latin typeface="Calibri"/>
-                      </a:endParaRPr>
-                    </a:p>
-                  </a:txBody>
-                  <a:tcPr marL="12700" marR="12700" marT="12700" marB="0" anchor="b"/>
-                </a:tc>
-              </a:tr>
-              <a:tr h="370840">
-                <a:tc>
-                  <a:txBody>
-                    <a:bodyPr/>
-                    <a:lstStyle/>
-                    <a:p>
-                      <a:pPr algn="ctr" fontAlgn="b"/>
-                      <a:r>
-                        <a:rPr lang="en-US" sz="2000" b="0" i="0" u="none" strike="noStrike">
-                          <a:solidFill>
-                            <a:srgbClr val="000000"/>
-                          </a:solidFill>
-                          <a:effectLst/>
-                          <a:latin typeface="Calibri"/>
-                        </a:rPr>
-                        <a:t>RubberWhale</a:t>
-                      </a:r>
-                    </a:p>
-                  </a:txBody>
-                  <a:tcPr marL="12700" marR="12700" marT="12700" marB="0" anchor="b"/>
-                </a:tc>
-                <a:tc>
-                  <a:txBody>
-                    <a:bodyPr/>
-                    <a:lstStyle/>
-                    <a:p>
-                      <a:pPr algn="ctr"/>
-                      <a:r>
-                        <a:rPr lang="en-US" sz="2000" dirty="0" smtClean="0"/>
-                        <a:t>92</a:t>
-                      </a:r>
-                      <a:endParaRPr lang="en-US" sz="2000" dirty="0"/>
-                    </a:p>
-                  </a:txBody>
-                  <a:tcPr/>
-                </a:tc>
-                <a:tc>
-                  <a:txBody>
-                    <a:bodyPr/>
-                    <a:lstStyle/>
-                    <a:p>
-                      <a:pPr algn="ctr"/>
-                      <a:r>
-                        <a:rPr lang="en-US" sz="2000" dirty="0" smtClean="0"/>
-                        <a:t>5.6</a:t>
-                      </a:r>
-                      <a:endParaRPr lang="en-US" sz="2000" dirty="0"/>
-                    </a:p>
-                  </a:txBody>
-                  <a:tcPr/>
-                </a:tc>
-                <a:tc>
-                  <a:txBody>
-                    <a:bodyPr/>
-                    <a:lstStyle/>
-                    <a:p>
-                      <a:pPr algn="ctr"/>
-                      <a:endParaRPr lang="en-US" sz="2000" dirty="0"/>
-                    </a:p>
-                  </a:txBody>
-                  <a:tcPr/>
-                </a:tc>
-                <a:tc>
-                  <a:txBody>
-                    <a:bodyPr/>
-                    <a:lstStyle/>
-                    <a:p>
-                      <a:pPr algn="ctr" fontAlgn="b"/>
-                      <a:r>
-                        <a:rPr lang="en-US" sz="2000" b="0" i="0" u="none" strike="noStrike" dirty="0" smtClean="0">
-                          <a:solidFill>
-                            <a:srgbClr val="000000"/>
-                          </a:solidFill>
-                          <a:effectLst/>
-                          <a:latin typeface="Calibri"/>
-                        </a:rPr>
-                        <a:t>210</a:t>
-                      </a:r>
-                      <a:endParaRPr lang="en-US" sz="2000" b="0" i="0" u="none" strike="noStrike" dirty="0">
-                        <a:solidFill>
-                          <a:srgbClr val="000000"/>
-                        </a:solidFill>
-                        <a:effectLst/>
-                        <a:latin typeface="Calibri"/>
-                      </a:endParaRPr>
-                    </a:p>
-                  </a:txBody>
-                  <a:tcPr marL="12700" marR="12700" marT="12700" marB="0" anchor="b"/>
-                </a:tc>
-                <a:tc>
-                  <a:txBody>
-                    <a:bodyPr/>
-                    <a:lstStyle/>
-                    <a:p>
-                      <a:pPr algn="ctr" fontAlgn="b"/>
-                      <a:r>
-                        <a:rPr lang="en-US" sz="2000" b="0" i="0" u="none" strike="noStrike" dirty="0" smtClean="0">
-                          <a:solidFill>
-                            <a:srgbClr val="000000"/>
-                          </a:solidFill>
-                          <a:effectLst/>
-                          <a:latin typeface="Calibri"/>
-                        </a:rPr>
-                        <a:t>3.8</a:t>
-                      </a:r>
-                      <a:endParaRPr lang="en-US" sz="2000" b="0" i="0" u="none" strike="noStrike" dirty="0">
-                        <a:solidFill>
-                          <a:srgbClr val="000000"/>
-                        </a:solidFill>
-                        <a:effectLst/>
-                        <a:latin typeface="Calibri"/>
-                      </a:endParaRPr>
-                    </a:p>
-                  </a:txBody>
-                  <a:tcPr marL="12700" marR="12700" marT="12700" marB="0" anchor="b"/>
-                </a:tc>
-                <a:tc>
-                  <a:txBody>
-                    <a:bodyPr/>
-                    <a:lstStyle/>
-                    <a:p>
-                      <a:pPr algn="ctr" fontAlgn="b"/>
-                      <a:endParaRPr lang="en-US" sz="2000" b="0" i="0" u="none" strike="noStrike" dirty="0">
-                        <a:solidFill>
-                          <a:srgbClr val="000000"/>
-                        </a:solidFill>
-                        <a:effectLst/>
-                        <a:latin typeface="Calibri"/>
-                      </a:endParaRPr>
-                    </a:p>
-                  </a:txBody>
-                  <a:tcPr marL="12700" marR="12700" marT="12700" marB="0" anchor="b"/>
-                </a:tc>
-              </a:tr>
-              <a:tr h="370840">
-                <a:tc>
-                  <a:txBody>
-                    <a:bodyPr/>
-                    <a:lstStyle/>
-                    <a:p>
-                      <a:pPr algn="ctr" fontAlgn="b"/>
-                      <a:r>
-                        <a:rPr lang="en-US" sz="2000" b="0" i="0" u="none" strike="noStrike" dirty="0" smtClean="0">
-                          <a:solidFill>
-                            <a:srgbClr val="000000"/>
-                          </a:solidFill>
-                          <a:effectLst/>
-                          <a:latin typeface="Calibri"/>
-                        </a:rPr>
-                        <a:t>Venus</a:t>
-                      </a:r>
-                      <a:endParaRPr lang="en-US" sz="2000" b="0" i="0" u="none" strike="noStrike" dirty="0">
-                        <a:solidFill>
-                          <a:srgbClr val="000000"/>
-                        </a:solidFill>
-                        <a:effectLst/>
-                        <a:latin typeface="Calibri"/>
-                      </a:endParaRPr>
-                    </a:p>
-                  </a:txBody>
-                  <a:tcPr marL="12700" marR="12700" marT="12700" marB="0" anchor="b"/>
-                </a:tc>
-                <a:tc>
-                  <a:txBody>
-                    <a:bodyPr/>
-                    <a:lstStyle/>
-                    <a:p>
-                      <a:pPr algn="ctr"/>
-                      <a:r>
-                        <a:rPr lang="en-US" sz="2000" dirty="0" smtClean="0"/>
-                        <a:t>59</a:t>
-                      </a:r>
-                      <a:endParaRPr lang="en-US" sz="2000" dirty="0"/>
-                    </a:p>
-                  </a:txBody>
-                  <a:tcPr/>
-                </a:tc>
-                <a:tc>
-                  <a:txBody>
-                    <a:bodyPr/>
-                    <a:lstStyle/>
-                    <a:p>
-                      <a:pPr algn="ctr"/>
-                      <a:r>
-                        <a:rPr lang="en-US" sz="2000" dirty="0" smtClean="0"/>
-                        <a:t>15.4</a:t>
-                      </a:r>
-                      <a:endParaRPr lang="en-US" sz="2000" dirty="0"/>
-                    </a:p>
-                  </a:txBody>
-                  <a:tcPr/>
-                </a:tc>
-                <a:tc>
-                  <a:txBody>
-                    <a:bodyPr/>
-                    <a:lstStyle/>
-                    <a:p>
-                      <a:pPr algn="ctr"/>
-                      <a:endParaRPr lang="en-US" sz="2000" dirty="0"/>
-                    </a:p>
-                  </a:txBody>
-                  <a:tcPr/>
-                </a:tc>
-                <a:tc>
-                  <a:txBody>
-                    <a:bodyPr/>
-                    <a:lstStyle/>
-                    <a:p>
-                      <a:pPr algn="ctr" fontAlgn="b"/>
-                      <a:r>
-                        <a:rPr lang="en-US" sz="2000" b="0" i="0" u="none" strike="noStrike" dirty="0" smtClean="0">
-                          <a:solidFill>
-                            <a:srgbClr val="000000"/>
-                          </a:solidFill>
-                          <a:effectLst/>
-                          <a:latin typeface="Calibri"/>
-                        </a:rPr>
-                        <a:t>139</a:t>
-                      </a:r>
-                      <a:endParaRPr lang="en-US" sz="2000" b="0" i="0" u="none" strike="noStrike" dirty="0">
-                        <a:solidFill>
-                          <a:srgbClr val="000000"/>
-                        </a:solidFill>
-                        <a:effectLst/>
-                        <a:latin typeface="Calibri"/>
-                      </a:endParaRPr>
-                    </a:p>
-                  </a:txBody>
-                  <a:tcPr marL="12700" marR="12700" marT="12700" marB="0" anchor="b"/>
-                </a:tc>
-                <a:tc>
-                  <a:txBody>
-                    <a:bodyPr/>
-                    <a:lstStyle/>
-                    <a:p>
-                      <a:pPr algn="ctr" fontAlgn="b"/>
-                      <a:r>
-                        <a:rPr lang="en-US" sz="2000" b="0" i="0" u="none" strike="noStrike" dirty="0" smtClean="0">
-                          <a:solidFill>
-                            <a:srgbClr val="000000"/>
-                          </a:solidFill>
-                          <a:effectLst/>
-                          <a:latin typeface="Calibri"/>
-                        </a:rPr>
-                        <a:t>4.4</a:t>
-                      </a:r>
-                      <a:endParaRPr lang="en-US" sz="2000" b="0" i="0" u="none" strike="noStrike" dirty="0">
-                        <a:solidFill>
-                          <a:srgbClr val="000000"/>
-                        </a:solidFill>
-                        <a:effectLst/>
-                        <a:latin typeface="Calibri"/>
-                      </a:endParaRPr>
-                    </a:p>
-                  </a:txBody>
-                  <a:tcPr marL="12700" marR="12700" marT="12700" marB="0" anchor="b"/>
-                </a:tc>
-                <a:tc>
-                  <a:txBody>
-                    <a:bodyPr/>
-                    <a:lstStyle/>
-                    <a:p>
-                      <a:pPr algn="ctr"/>
-                      <a:endParaRPr lang="en-US" sz="2000" dirty="0"/>
-                    </a:p>
-                  </a:txBody>
-                  <a:tcPr marL="12700" marR="12700" marT="12700" marB="0" anchor="b"/>
-                </a:tc>
-              </a:tr>
-              <a:tr h="370840">
-                <a:tc>
-                  <a:txBody>
-                    <a:bodyPr/>
-                    <a:lstStyle/>
-                    <a:p>
-                      <a:pPr algn="ctr" fontAlgn="b"/>
-                      <a:r>
-                        <a:rPr lang="en-US" sz="2000" b="0" i="0" u="none" strike="noStrike" dirty="0" smtClean="0">
-                          <a:solidFill>
-                            <a:srgbClr val="000000"/>
-                          </a:solidFill>
-                          <a:effectLst/>
-                          <a:latin typeface="Calibri"/>
-                        </a:rPr>
-                        <a:t>Urban2</a:t>
-                      </a:r>
-                      <a:endParaRPr lang="en-US" sz="2000" b="0" i="0" u="none" strike="noStrike" dirty="0">
-                        <a:solidFill>
-                          <a:srgbClr val="000000"/>
-                        </a:solidFill>
-                        <a:effectLst/>
-                        <a:latin typeface="Calibri"/>
-                      </a:endParaRPr>
-                    </a:p>
-                  </a:txBody>
-                  <a:tcPr marL="12700" marR="12700" marT="12700" marB="0" anchor="b">
-                    <a:solidFill>
-                      <a:srgbClr val="FF0000"/>
-                    </a:solidFill>
-                  </a:tcPr>
-                </a:tc>
-                <a:tc>
-                  <a:txBody>
-                    <a:bodyPr/>
-                    <a:lstStyle/>
-                    <a:p>
-                      <a:pPr algn="ctr"/>
-                      <a:r>
-                        <a:rPr lang="en-US" sz="2000" dirty="0" smtClean="0"/>
-                        <a:t>127</a:t>
-                      </a:r>
-                      <a:endParaRPr lang="en-US" sz="2000" dirty="0"/>
-                    </a:p>
-                  </a:txBody>
-                  <a:tcPr>
-                    <a:solidFill>
-                      <a:srgbClr val="FF0000"/>
-                    </a:solidFill>
-                  </a:tcPr>
-                </a:tc>
-                <a:tc>
-                  <a:txBody>
-                    <a:bodyPr/>
-                    <a:lstStyle/>
-                    <a:p>
-                      <a:pPr algn="ctr"/>
-                      <a:r>
-                        <a:rPr lang="en-US" sz="2000" dirty="0" smtClean="0"/>
-                        <a:t>27.2</a:t>
-                      </a:r>
-                      <a:endParaRPr lang="en-US" sz="2000" dirty="0"/>
-                    </a:p>
-                  </a:txBody>
-                  <a:tcPr>
-                    <a:solidFill>
-                      <a:srgbClr val="FF0000"/>
-                    </a:solidFill>
-                  </a:tcPr>
-                </a:tc>
-                <a:tc>
-                  <a:txBody>
-                    <a:bodyPr/>
-                    <a:lstStyle/>
-                    <a:p>
-                      <a:pPr algn="ctr"/>
-                      <a:r>
-                        <a:rPr lang="en-US" sz="2000" dirty="0" smtClean="0"/>
-                        <a:t>6.4</a:t>
-                      </a:r>
-                      <a:endParaRPr lang="en-US" sz="2000" dirty="0"/>
-                    </a:p>
-                  </a:txBody>
-                  <a:tcPr>
-                    <a:solidFill>
-                      <a:srgbClr val="FF0000"/>
-                    </a:solidFill>
-                  </a:tcPr>
-                </a:tc>
-                <a:tc>
-                  <a:txBody>
-                    <a:bodyPr/>
-                    <a:lstStyle/>
-                    <a:p>
-                      <a:pPr algn="ctr" fontAlgn="b"/>
-                      <a:r>
-                        <a:rPr lang="en-US" sz="2000" b="0" i="0" u="none" strike="noStrike" dirty="0" smtClean="0">
-                          <a:solidFill>
-                            <a:srgbClr val="000000"/>
-                          </a:solidFill>
-                          <a:effectLst/>
-                          <a:latin typeface="Calibri"/>
-                        </a:rPr>
-                        <a:t>306</a:t>
-                      </a:r>
-                      <a:endParaRPr lang="en-US" sz="2000" b="0" i="0" u="none" strike="noStrike" dirty="0">
-                        <a:solidFill>
-                          <a:srgbClr val="000000"/>
-                        </a:solidFill>
-                        <a:effectLst/>
-                        <a:latin typeface="Calibri"/>
-                      </a:endParaRPr>
-                    </a:p>
-                  </a:txBody>
-                  <a:tcPr marL="12700" marR="12700" marT="12700" marB="0" anchor="b">
-                    <a:solidFill>
-                      <a:srgbClr val="FF0000"/>
-                    </a:solidFill>
-                  </a:tcPr>
-                </a:tc>
-                <a:tc>
-                  <a:txBody>
-                    <a:bodyPr/>
-                    <a:lstStyle/>
-                    <a:p>
-                      <a:pPr algn="ctr" fontAlgn="b"/>
-                      <a:r>
-                        <a:rPr lang="en-US" sz="2000" b="0" i="0" u="none" strike="noStrike" dirty="0" smtClean="0">
-                          <a:solidFill>
-                            <a:srgbClr val="000000"/>
-                          </a:solidFill>
-                          <a:effectLst/>
-                          <a:latin typeface="Calibri"/>
-                        </a:rPr>
-                        <a:t>3.0</a:t>
-                      </a:r>
-                      <a:endParaRPr lang="en-US" sz="2000" b="0" i="0" u="none" strike="noStrike" dirty="0">
-                        <a:solidFill>
-                          <a:srgbClr val="000000"/>
-                        </a:solidFill>
-                        <a:effectLst/>
-                        <a:latin typeface="Calibri"/>
-                      </a:endParaRPr>
-                    </a:p>
-                  </a:txBody>
-                  <a:tcPr marL="12700" marR="12700" marT="12700" marB="0" anchor="b">
-                    <a:solidFill>
-                      <a:srgbClr val="FF0000"/>
-                    </a:solidFill>
-                  </a:tcPr>
-                </a:tc>
-                <a:tc>
-                  <a:txBody>
-                    <a:bodyPr/>
-                    <a:lstStyle/>
-                    <a:p>
-                      <a:pPr algn="ctr" fontAlgn="b"/>
-                      <a:r>
-                        <a:rPr lang="en-US" sz="2000" b="0" i="0" u="none" strike="noStrike" dirty="0">
-                          <a:solidFill>
-                            <a:srgbClr val="000000"/>
-                          </a:solidFill>
-                          <a:effectLst/>
-                          <a:latin typeface="Calibri"/>
-                        </a:rPr>
-                        <a:t>0.414</a:t>
-                      </a:r>
-                    </a:p>
-                  </a:txBody>
-                  <a:tcPr marL="12700" marR="12700" marT="12700" marB="0" anchor="b">
-                    <a:solidFill>
-                      <a:srgbClr val="FF0000"/>
-                    </a:solidFill>
-                  </a:tcPr>
-                </a:tc>
-              </a:tr>
-              <a:tr h="370840">
-                <a:tc>
-                  <a:txBody>
-                    <a:bodyPr/>
-                    <a:lstStyle/>
-                    <a:p>
-                      <a:pPr algn="ctr" fontAlgn="b"/>
-                      <a:r>
-                        <a:rPr lang="en-US" sz="2000" b="0" i="0" u="none" strike="noStrike" dirty="0" smtClean="0">
-                          <a:solidFill>
-                            <a:srgbClr val="000000"/>
-                          </a:solidFill>
-                          <a:effectLst/>
-                          <a:latin typeface="Calibri"/>
-                        </a:rPr>
-                        <a:t>Urban3</a:t>
-                      </a:r>
-                      <a:endParaRPr lang="en-US" sz="2000" b="0" i="0" u="none" strike="noStrike" dirty="0">
-                        <a:solidFill>
-                          <a:srgbClr val="000000"/>
-                        </a:solidFill>
-                        <a:effectLst/>
-                        <a:latin typeface="Calibri"/>
-                      </a:endParaRPr>
-                    </a:p>
-                  </a:txBody>
-                  <a:tcPr marL="12700" marR="12700" marT="12700" marB="0" anchor="b">
-                    <a:solidFill>
-                      <a:srgbClr val="FF0000"/>
-                    </a:solidFill>
-                  </a:tcPr>
-                </a:tc>
-                <a:tc>
-                  <a:txBody>
-                    <a:bodyPr/>
-                    <a:lstStyle/>
-                    <a:p>
-                      <a:pPr algn="ctr"/>
-                      <a:r>
-                        <a:rPr lang="en-US" sz="2000" dirty="0" smtClean="0"/>
-                        <a:t>117</a:t>
-                      </a:r>
-                      <a:endParaRPr lang="en-US" sz="2000" dirty="0"/>
-                    </a:p>
-                  </a:txBody>
-                  <a:tcPr>
-                    <a:solidFill>
-                      <a:srgbClr val="FF0000"/>
-                    </a:solidFill>
-                  </a:tcPr>
-                </a:tc>
-                <a:tc>
-                  <a:txBody>
-                    <a:bodyPr/>
-                    <a:lstStyle/>
-                    <a:p>
-                      <a:pPr algn="ctr"/>
-                      <a:r>
-                        <a:rPr lang="en-US" sz="2000" dirty="0" smtClean="0"/>
-                        <a:t>51.0</a:t>
-                      </a:r>
-                      <a:endParaRPr lang="en-US" sz="2000" dirty="0"/>
-                    </a:p>
-                  </a:txBody>
-                  <a:tcPr>
-                    <a:solidFill>
-                      <a:srgbClr val="FF0000"/>
-                    </a:solidFill>
-                  </a:tcPr>
-                </a:tc>
-                <a:tc>
-                  <a:txBody>
-                    <a:bodyPr/>
-                    <a:lstStyle/>
-                    <a:p>
-                      <a:pPr algn="ctr"/>
-                      <a:r>
-                        <a:rPr lang="en-US" sz="2000" dirty="0" smtClean="0"/>
-                        <a:t>6.2</a:t>
-                      </a:r>
-                      <a:endParaRPr lang="en-US" sz="2000" dirty="0"/>
-                    </a:p>
-                  </a:txBody>
-                  <a:tcPr>
-                    <a:solidFill>
-                      <a:srgbClr val="FF0000"/>
-                    </a:solidFill>
-                  </a:tcPr>
-                </a:tc>
-                <a:tc>
-                  <a:txBody>
-                    <a:bodyPr/>
-                    <a:lstStyle/>
-                    <a:p>
-                      <a:pPr algn="ctr" fontAlgn="b"/>
-                      <a:r>
-                        <a:rPr lang="en-US" sz="2000" b="0" i="0" u="none" strike="noStrike" dirty="0" smtClean="0">
-                          <a:solidFill>
-                            <a:srgbClr val="000000"/>
-                          </a:solidFill>
-                          <a:effectLst/>
-                          <a:latin typeface="Calibri"/>
-                        </a:rPr>
-                        <a:t>304</a:t>
-                      </a:r>
-                      <a:endParaRPr lang="en-US" sz="2000" b="0" i="0" u="none" strike="noStrike" dirty="0">
-                        <a:solidFill>
-                          <a:srgbClr val="000000"/>
-                        </a:solidFill>
-                        <a:effectLst/>
-                        <a:latin typeface="Calibri"/>
-                      </a:endParaRPr>
-                    </a:p>
-                  </a:txBody>
-                  <a:tcPr marL="12700" marR="12700" marT="12700" marB="0" anchor="b">
-                    <a:solidFill>
-                      <a:srgbClr val="FF0000"/>
-                    </a:solidFill>
-                  </a:tcPr>
-                </a:tc>
-                <a:tc>
-                  <a:txBody>
-                    <a:bodyPr/>
-                    <a:lstStyle/>
-                    <a:p>
-                      <a:pPr algn="ctr" fontAlgn="b"/>
-                      <a:r>
-                        <a:rPr lang="en-US" sz="2000" b="0" i="0" u="none" strike="noStrike" dirty="0" smtClean="0">
-                          <a:solidFill>
-                            <a:srgbClr val="000000"/>
-                          </a:solidFill>
-                          <a:effectLst/>
-                          <a:latin typeface="Calibri"/>
-                        </a:rPr>
-                        <a:t>8.1</a:t>
-                      </a:r>
-                      <a:endParaRPr lang="en-US" sz="2000" b="0" i="0" u="none" strike="noStrike" dirty="0">
-                        <a:solidFill>
-                          <a:srgbClr val="000000"/>
-                        </a:solidFill>
-                        <a:effectLst/>
-                        <a:latin typeface="Calibri"/>
-                      </a:endParaRPr>
-                    </a:p>
-                  </a:txBody>
-                  <a:tcPr marL="12700" marR="12700" marT="12700" marB="0" anchor="b">
-                    <a:solidFill>
-                      <a:srgbClr val="FF0000"/>
-                    </a:solidFill>
-                  </a:tcPr>
-                </a:tc>
-                <a:tc>
-                  <a:txBody>
-                    <a:bodyPr/>
-                    <a:lstStyle/>
-                    <a:p>
-                      <a:pPr algn="ctr" fontAlgn="b"/>
-                      <a:r>
-                        <a:rPr lang="en-US" sz="2000" b="0" i="0" u="none" strike="noStrike" dirty="0">
-                          <a:solidFill>
-                            <a:srgbClr val="000000"/>
-                          </a:solidFill>
-                          <a:effectLst/>
-                          <a:latin typeface="Calibri"/>
-                        </a:rPr>
-                        <a:t>1.003</a:t>
-                      </a:r>
-                    </a:p>
-                  </a:txBody>
-                  <a:tcPr marL="12700" marR="12700" marT="12700" marB="0" anchor="b">
-                    <a:solidFill>
-                      <a:srgbClr val="FF0000"/>
-                    </a:solidFill>
-                  </a:tcPr>
-                </a:tc>
-              </a:tr>
-            </a:tbl>
-          </a:graphicData>
-        </a:graphic>
-      </p:graphicFrame>
+        </p:nvSpPr>
+        <p:spPr/>
+        <p:txBody>
+          <a:bodyPr>
+            <a:normAutofit/>
+          </a:bodyPr>
+          <a:lstStyle/>
+          <a:p>
+            <a:r>
+              <a:rPr lang="en-US" sz="2400" dirty="0" smtClean="0"/>
+              <a:t>Used Middlebury Optical Flow Training Set (n=8)</a:t>
+            </a:r>
+          </a:p>
+          <a:p>
+            <a:endParaRPr lang="en-US" sz="2400" dirty="0"/>
+          </a:p>
+          <a:p>
+            <a:r>
+              <a:rPr lang="en-US" sz="2400" dirty="0" smtClean="0"/>
+              <a:t>Evaluated our proposed methods (with regular and weighted median filtering) and Classic++ against ground truth flow</a:t>
+            </a:r>
+          </a:p>
+          <a:p>
+            <a:endParaRPr lang="en-US" sz="2400" dirty="0"/>
+          </a:p>
+          <a:p>
+            <a:r>
+              <a:rPr lang="en-US" sz="2400" dirty="0" smtClean="0"/>
+              <a:t>Evaluation Metrics </a:t>
+            </a:r>
+          </a:p>
+          <a:p>
+            <a:pPr lvl="1"/>
+            <a:r>
+              <a:rPr lang="en-US" sz="2000" dirty="0" smtClean="0"/>
+              <a:t>Time (seconds)</a:t>
+            </a:r>
+          </a:p>
+          <a:p>
+            <a:pPr lvl="1"/>
+            <a:r>
+              <a:rPr lang="en-US" sz="2000" dirty="0" smtClean="0"/>
+              <a:t>Average Angular Error (AAE): </a:t>
+            </a:r>
+          </a:p>
+          <a:p>
+            <a:pPr lvl="1"/>
+            <a:r>
+              <a:rPr lang="en-US" sz="2000" dirty="0" smtClean="0"/>
+              <a:t>Average Endpoint Error (EPE)</a:t>
+            </a:r>
+            <a:endParaRPr lang="en-US" sz="2000" dirty="0"/>
+          </a:p>
+        </p:txBody>
+      </p:sp>
     </p:spTree>
     <p:extLst>
       <p:ext uri="{BB962C8B-B14F-4D97-AF65-F5344CB8AC3E}">
-        <p14:creationId xmlns:p14="http://schemas.microsoft.com/office/powerpoint/2010/main" val="2762439058"/>
+        <p14:creationId xmlns:p14="http://schemas.microsoft.com/office/powerpoint/2010/main" val="3211242648"/>
       </p:ext>
     </p:extLst>
   </p:cSld>
   <p:clrMapOvr>
     <a:masterClrMapping/>
   </p:clrMapOvr>
+  <p:timing>
+    <p:tnLst>
+      <p:par>
+        <p:cTn xmlns:p14="http://schemas.microsoft.com/office/powerpoint/2010/main" id="1" dur="indefinite" restart="never" nodeType="tmRoot"/>
+      </p:par>
+    </p:tnLst>
+  </p:timing>
 </p:sld>
 </file>
 
@@ -7949,13 +7242,13 @@
             <p:ph idx="1"/>
             <p:extLst>
               <p:ext uri="{D42A27DB-BD31-4B8C-83A1-F6EECF244321}">
-                <p14:modId xmlns:p14="http://schemas.microsoft.com/office/powerpoint/2010/main" val="1315544515"/>
+                <p14:modId xmlns:p14="http://schemas.microsoft.com/office/powerpoint/2010/main" val="1373788648"/>
               </p:ext>
             </p:extLst>
           </p:nvPr>
         </p:nvGraphicFramePr>
         <p:xfrm>
-          <a:off x="457200" y="1600200"/>
+          <a:off x="457200" y="1536700"/>
           <a:ext cx="8229600" cy="4267200"/>
         </p:xfrm>
         <a:graphic>
@@ -8123,7 +7416,7 @@
                       <a:pPr algn="ctr"/>
                       <a:r>
                         <a:rPr lang="en-US" sz="2000" b="1" dirty="0" smtClean="0"/>
-                        <a:t>AEP</a:t>
+                        <a:t>EPE</a:t>
                       </a:r>
                       <a:endParaRPr lang="en-US" sz="2000" b="1" dirty="0"/>
                     </a:p>
@@ -8168,7 +7461,7 @@
                       <a:pPr algn="ctr"/>
                       <a:r>
                         <a:rPr lang="en-US" sz="2000" b="1" dirty="0" smtClean="0"/>
-                        <a:t>AEP</a:t>
+                        <a:t>EPE</a:t>
                       </a:r>
                       <a:endParaRPr lang="en-US" sz="2000" b="1" dirty="0"/>
                     </a:p>
@@ -9361,10 +8654,99 @@
           </a:graphicData>
         </a:graphic>
       </p:graphicFrame>
+      <p:sp>
+        <p:nvSpPr>
+          <p:cNvPr id="6" name="Rectangle 5"/>
+          <p:cNvSpPr/>
+          <p:nvPr/>
+        </p:nvSpPr>
+        <p:spPr>
+          <a:xfrm>
+            <a:off x="720766" y="5911010"/>
+            <a:ext cx="7539438" cy="881028"/>
+          </a:xfrm>
+          <a:prstGeom prst="rect">
+            <a:avLst/>
+          </a:prstGeom>
+          <a:noFill/>
+          <a:ln w="28575" cmpd="sng">
+            <a:solidFill>
+              <a:srgbClr val="FF0000"/>
+            </a:solidFill>
+          </a:ln>
+          <a:effectLst/>
+        </p:spPr>
+        <p:style>
+          <a:lnRef idx="1">
+            <a:schemeClr val="accent1"/>
+          </a:lnRef>
+          <a:fillRef idx="3">
+            <a:schemeClr val="accent1"/>
+          </a:fillRef>
+          <a:effectRef idx="2">
+            <a:schemeClr val="accent1"/>
+          </a:effectRef>
+          <a:fontRef idx="minor">
+            <a:schemeClr val="lt1"/>
+          </a:fontRef>
+        </p:style>
+        <p:txBody>
+          <a:bodyPr rtlCol="0" anchor="ctr"/>
+          <a:lstStyle/>
+          <a:p>
+            <a:r>
+              <a:rPr lang="en-US" sz="2400" dirty="0" smtClean="0">
+                <a:solidFill>
+                  <a:schemeClr val="tx1"/>
+                </a:solidFill>
+              </a:rPr>
+              <a:t> </a:t>
+            </a:r>
+          </a:p>
+          <a:p>
+            <a:r>
+              <a:rPr lang="en-US" sz="2400" dirty="0" smtClean="0">
+                <a:solidFill>
+                  <a:schemeClr val="tx1"/>
+                </a:solidFill>
+              </a:rPr>
+              <a:t>We achieve reasonable AAE and AEP using our approach while reducing the </a:t>
+            </a:r>
+            <a:r>
+              <a:rPr lang="en-US" sz="2400" b="1" dirty="0" smtClean="0">
+                <a:solidFill>
+                  <a:schemeClr val="tx1"/>
+                </a:solidFill>
+              </a:rPr>
+              <a:t>computation time by at least 2x</a:t>
+            </a:r>
+            <a:r>
+              <a:rPr lang="en-US" sz="2400" dirty="0" smtClean="0">
+                <a:solidFill>
+                  <a:schemeClr val="tx1"/>
+                </a:solidFill>
+              </a:rPr>
+              <a:t>.</a:t>
+            </a:r>
+            <a:endParaRPr lang="en-US" sz="2400" dirty="0">
+              <a:solidFill>
+                <a:schemeClr val="tx1"/>
+              </a:solidFill>
+            </a:endParaRPr>
+          </a:p>
+          <a:p>
+            <a:endParaRPr lang="en-US" sz="2400" dirty="0">
+              <a:solidFill>
+                <a:schemeClr val="tx1"/>
+              </a:solidFill>
+            </a:endParaRPr>
+          </a:p>
+        </p:txBody>
+      </p:sp>
     </p:spTree>
     <p:extLst>
       <p:ext uri="{BB962C8B-B14F-4D97-AF65-F5344CB8AC3E}">
-        <p14:creationId xmlns:p14="http://schemas.microsoft.com/office/powerpoint/2010/main" val="3966672602"/>
+        <p14:creationId xmlns:p14="http://schemas.microsoft.com/office/powerpoint/2010/main" val="2762439058"/>
       </p:ext>
     </p:extLst>
   </p:cSld>
@@ -9407,21 +8789,1576 @@
           <a:lstStyle/>
           <a:p>
             <a:r>
-              <a:rPr lang="en-US" dirty="0" smtClean="0"/>
-              <a:t>Contributions</a:t>
-            </a:r>
-            <a:endParaRPr lang="en-US" dirty="0"/>
-          </a:p>
-        </p:txBody>
-      </p:sp>
-      <p:sp>
-        <p:nvSpPr>
-          <p:cNvPr id="3" name="Content Placeholder 2"/>
+              <a:rPr lang="en-US" b="1" dirty="0" smtClean="0">
+                <a:solidFill>
+                  <a:srgbClr val="0000FF"/>
+                </a:solidFill>
+              </a:rPr>
+              <a:t>Results (</a:t>
+            </a:r>
+            <a:r>
+              <a:rPr lang="en-US" b="1" dirty="0" err="1" smtClean="0">
+                <a:solidFill>
+                  <a:srgbClr val="0000FF"/>
+                </a:solidFill>
+              </a:rPr>
+              <a:t>con’t</a:t>
+            </a:r>
+            <a:r>
+              <a:rPr lang="en-US" b="1" dirty="0" smtClean="0">
+                <a:solidFill>
+                  <a:srgbClr val="0000FF"/>
+                </a:solidFill>
+              </a:rPr>
+              <a:t>) </a:t>
+            </a:r>
+            <a:endParaRPr lang="en-US" b="1" dirty="0">
+              <a:solidFill>
+                <a:srgbClr val="0000FF"/>
+              </a:solidFill>
+            </a:endParaRPr>
+          </a:p>
+        </p:txBody>
+      </p:sp>
+      <p:graphicFrame>
+        <p:nvGraphicFramePr>
+          <p:cNvPr id="4" name="Content Placeholder 3"/>
+          <p:cNvGraphicFramePr>
+            <a:graphicFrameLocks noGrp="1"/>
+          </p:cNvGraphicFramePr>
+          <p:nvPr>
+            <p:ph idx="1"/>
+            <p:extLst>
+              <p:ext uri="{D42A27DB-BD31-4B8C-83A1-F6EECF244321}">
+                <p14:modId xmlns:p14="http://schemas.microsoft.com/office/powerpoint/2010/main" val="2805967543"/>
+              </p:ext>
+            </p:extLst>
+          </p:nvPr>
+        </p:nvGraphicFramePr>
+        <p:xfrm>
+          <a:off x="457200" y="1536700"/>
+          <a:ext cx="8229600" cy="4267200"/>
+        </p:xfrm>
+        <a:graphic>
+          <a:graphicData uri="http://schemas.openxmlformats.org/drawingml/2006/table">
+            <a:tbl>
+              <a:tblPr firstRow="1" bandRow="1">
+                <a:tableStyleId>{073A0DAA-6AF3-43AB-8588-CEC1D06C72B9}</a:tableStyleId>
+              </a:tblPr>
+              <a:tblGrid>
+                <a:gridCol w="1727979"/>
+                <a:gridCol w="1083055"/>
+                <a:gridCol w="1083056"/>
+                <a:gridCol w="1083055"/>
+                <a:gridCol w="1084152"/>
+                <a:gridCol w="1084151"/>
+                <a:gridCol w="1084152"/>
+              </a:tblGrid>
+              <a:tr h="370840">
+                <a:tc>
+                  <a:txBody>
+                    <a:bodyPr/>
+                    <a:lstStyle/>
+                    <a:p>
+                      <a:endParaRPr lang="en-US" sz="2000" dirty="0"/>
+                    </a:p>
+                  </a:txBody>
+                  <a:tcPr anchor="ctr"/>
+                </a:tc>
+                <a:tc gridSpan="3">
+                  <a:txBody>
+                    <a:bodyPr/>
+                    <a:lstStyle/>
+                    <a:p>
+                      <a:pPr marL="0" indent="0" algn="ctr">
+                        <a:buFont typeface="+mj-lt"/>
+                        <a:buNone/>
+                      </a:pPr>
+                      <a:r>
+                        <a:rPr lang="en-US" sz="2000" dirty="0" smtClean="0"/>
+                        <a:t>Our Method With</a:t>
+                      </a:r>
+                      <a:r>
+                        <a:rPr lang="en-US" sz="2000" baseline="0" dirty="0" smtClean="0"/>
+                        <a:t> </a:t>
+                      </a:r>
+                    </a:p>
+                    <a:p>
+                      <a:pPr marL="0" indent="0" algn="ctr">
+                        <a:buFont typeface="+mj-lt"/>
+                        <a:buNone/>
+                      </a:pPr>
+                      <a:r>
+                        <a:rPr lang="en-US" sz="2000" dirty="0" smtClean="0"/>
+                        <a:t>Weighted Median</a:t>
+                      </a:r>
+                      <a:endParaRPr lang="en-US" sz="2000" dirty="0"/>
+                    </a:p>
+                  </a:txBody>
+                  <a:tcPr anchor="ctr"/>
+                </a:tc>
+                <a:tc hMerge="1">
+                  <a:txBody>
+                    <a:bodyPr/>
+                    <a:lstStyle/>
+                    <a:p>
+                      <a:endParaRPr lang="en-US"/>
+                    </a:p>
+                  </a:txBody>
+                  <a:tcPr/>
+                </a:tc>
+                <a:tc hMerge="1">
+                  <a:txBody>
+                    <a:bodyPr/>
+                    <a:lstStyle/>
+                    <a:p>
+                      <a:endParaRPr lang="en-US"/>
+                    </a:p>
+                  </a:txBody>
+                  <a:tcPr/>
+                </a:tc>
+                <a:tc gridSpan="3">
+                  <a:txBody>
+                    <a:bodyPr/>
+                    <a:lstStyle/>
+                    <a:p>
+                      <a:pPr marL="0" indent="0" algn="ctr">
+                        <a:buFont typeface="+mj-lt"/>
+                        <a:buNone/>
+                      </a:pPr>
+                      <a:r>
+                        <a:rPr lang="en-US" sz="2000" dirty="0" smtClean="0"/>
+                        <a:t>Classic++</a:t>
+                      </a:r>
+                      <a:endParaRPr lang="en-US" sz="2000" dirty="0"/>
+                    </a:p>
+                  </a:txBody>
+                  <a:tcPr anchor="ctr"/>
+                </a:tc>
+                <a:tc hMerge="1">
+                  <a:txBody>
+                    <a:bodyPr/>
+                    <a:lstStyle/>
+                    <a:p>
+                      <a:endParaRPr lang="en-US"/>
+                    </a:p>
+                  </a:txBody>
+                  <a:tcPr/>
+                </a:tc>
+                <a:tc hMerge="1">
+                  <a:txBody>
+                    <a:bodyPr/>
+                    <a:lstStyle/>
+                    <a:p>
+                      <a:endParaRPr lang="en-US"/>
+                    </a:p>
+                  </a:txBody>
+                  <a:tcPr/>
+                </a:tc>
+              </a:tr>
+              <a:tr h="370840">
+                <a:tc>
+                  <a:txBody>
+                    <a:bodyPr/>
+                    <a:lstStyle/>
+                    <a:p>
+                      <a:pPr algn="ctr"/>
+                      <a:r>
+                        <a:rPr lang="en-US" sz="2000" b="1" dirty="0" smtClean="0"/>
+                        <a:t>Name</a:t>
+                      </a:r>
+                      <a:endParaRPr lang="en-US" sz="2000" b="1" dirty="0"/>
+                    </a:p>
+                  </a:txBody>
+                  <a:tcPr/>
+                </a:tc>
+                <a:tc>
+                  <a:txBody>
+                    <a:bodyPr/>
+                    <a:lstStyle/>
+                    <a:p>
+                      <a:pPr algn="ctr"/>
+                      <a:r>
+                        <a:rPr lang="en-US" sz="2000" b="1" dirty="0" smtClean="0"/>
+                        <a:t>Time</a:t>
+                      </a:r>
+                      <a:endParaRPr lang="en-US" sz="2000" b="1" dirty="0"/>
+                    </a:p>
+                  </a:txBody>
+                  <a:tcPr/>
+                </a:tc>
+                <a:tc>
+                  <a:txBody>
+                    <a:bodyPr/>
+                    <a:lstStyle/>
+                    <a:p>
+                      <a:pPr algn="ctr"/>
+                      <a:r>
+                        <a:rPr lang="en-US" sz="2000" b="1" dirty="0" smtClean="0"/>
+                        <a:t>AAE</a:t>
+                      </a:r>
+                      <a:endParaRPr lang="en-US" sz="2000" b="1" dirty="0"/>
+                    </a:p>
+                  </a:txBody>
+                  <a:tcPr/>
+                </a:tc>
+                <a:tc>
+                  <a:txBody>
+                    <a:bodyPr/>
+                    <a:lstStyle/>
+                    <a:p>
+                      <a:pPr algn="ctr"/>
+                      <a:r>
+                        <a:rPr lang="en-US" sz="2000" b="1" dirty="0" smtClean="0"/>
+                        <a:t>EPE</a:t>
+                      </a:r>
+                      <a:endParaRPr lang="en-US" sz="2000" b="1" dirty="0"/>
+                    </a:p>
+                  </a:txBody>
+                  <a:tcPr/>
+                </a:tc>
+                <a:tc>
+                  <a:txBody>
+                    <a:bodyPr/>
+                    <a:lstStyle/>
+                    <a:p>
+                      <a:pPr algn="ctr"/>
+                      <a:r>
+                        <a:rPr lang="en-US" sz="2000" b="1" dirty="0" smtClean="0"/>
+                        <a:t>Time</a:t>
+                      </a:r>
+                      <a:endParaRPr lang="en-US" sz="2000" b="1" dirty="0"/>
+                    </a:p>
+                  </a:txBody>
+                  <a:tcPr/>
+                </a:tc>
+                <a:tc>
+                  <a:txBody>
+                    <a:bodyPr/>
+                    <a:lstStyle/>
+                    <a:p>
+                      <a:pPr algn="ctr"/>
+                      <a:r>
+                        <a:rPr lang="en-US" sz="2000" b="1" dirty="0" smtClean="0"/>
+                        <a:t>AAE</a:t>
+                      </a:r>
+                      <a:endParaRPr lang="en-US" sz="2000" b="1" dirty="0"/>
+                    </a:p>
+                  </a:txBody>
+                  <a:tcPr/>
+                </a:tc>
+                <a:tc>
+                  <a:txBody>
+                    <a:bodyPr/>
+                    <a:lstStyle/>
+                    <a:p>
+                      <a:pPr algn="ctr"/>
+                      <a:r>
+                        <a:rPr lang="en-US" sz="2000" b="1" dirty="0" smtClean="0"/>
+                        <a:t>EPE</a:t>
+                      </a:r>
+                      <a:endParaRPr lang="en-US" sz="2000" b="1" dirty="0"/>
+                    </a:p>
+                  </a:txBody>
+                  <a:tcPr/>
+                </a:tc>
+              </a:tr>
+              <a:tr h="370840">
+                <a:tc>
+                  <a:txBody>
+                    <a:bodyPr/>
+                    <a:lstStyle/>
+                    <a:p>
+                      <a:pPr algn="ctr" fontAlgn="b"/>
+                      <a:r>
+                        <a:rPr lang="en-US" sz="2000" b="0" i="0" u="none" strike="noStrike" dirty="0" err="1">
+                          <a:solidFill>
+                            <a:srgbClr val="000000"/>
+                          </a:solidFill>
+                          <a:effectLst/>
+                          <a:latin typeface="Calibri"/>
+                        </a:rPr>
+                        <a:t>Dimetrodon</a:t>
+                      </a:r>
+                      <a:r>
+                        <a:rPr lang="en-US" sz="2000" b="0" i="0" u="none" strike="noStrike" dirty="0">
+                          <a:solidFill>
+                            <a:srgbClr val="000000"/>
+                          </a:solidFill>
+                          <a:effectLst/>
+                          <a:latin typeface="Calibri"/>
+                        </a:rPr>
+                        <a:t> </a:t>
+                      </a:r>
+                    </a:p>
+                  </a:txBody>
+                  <a:tcPr marL="12700" marR="12700" marT="12700" marB="0" anchor="b"/>
+                </a:tc>
+                <a:tc>
+                  <a:txBody>
+                    <a:bodyPr/>
+                    <a:lstStyle/>
+                    <a:p>
+                      <a:pPr algn="ctr"/>
+                      <a:r>
+                        <a:rPr lang="en-US" sz="2000" dirty="0" smtClean="0"/>
+                        <a:t>184</a:t>
+                      </a:r>
+                      <a:endParaRPr lang="en-US" sz="2000" dirty="0"/>
+                    </a:p>
+                  </a:txBody>
+                  <a:tcPr/>
+                </a:tc>
+                <a:tc>
+                  <a:txBody>
+                    <a:bodyPr/>
+                    <a:lstStyle/>
+                    <a:p>
+                      <a:pPr algn="ctr"/>
+                      <a:r>
+                        <a:rPr lang="en-US" sz="2000" dirty="0" smtClean="0"/>
+                        <a:t>8.4</a:t>
+                      </a:r>
+                      <a:endParaRPr lang="en-US" sz="2000" dirty="0"/>
+                    </a:p>
+                  </a:txBody>
+                  <a:tcPr/>
+                </a:tc>
+                <a:tc>
+                  <a:txBody>
+                    <a:bodyPr/>
+                    <a:lstStyle/>
+                    <a:p>
+                      <a:pPr algn="ctr"/>
+                      <a:endParaRPr lang="en-US" sz="2000" dirty="0"/>
+                    </a:p>
+                  </a:txBody>
+                  <a:tcPr/>
+                </a:tc>
+                <a:tc>
+                  <a:txBody>
+                    <a:bodyPr/>
+                    <a:lstStyle/>
+                    <a:p>
+                      <a:pPr algn="ctr" fontAlgn="b"/>
+                      <a:r>
+                        <a:rPr lang="en-US" sz="2000" b="0" i="0" u="none" strike="noStrike" dirty="0" smtClean="0">
+                          <a:solidFill>
+                            <a:srgbClr val="000000"/>
+                          </a:solidFill>
+                          <a:effectLst/>
+                          <a:latin typeface="Calibri"/>
+                        </a:rPr>
+                        <a:t>215</a:t>
+                      </a:r>
+                      <a:endParaRPr lang="en-US" sz="2000" b="0" i="0" u="none" strike="noStrike" dirty="0">
+                        <a:solidFill>
+                          <a:srgbClr val="000000"/>
+                        </a:solidFill>
+                        <a:effectLst/>
+                        <a:latin typeface="Calibri"/>
+                      </a:endParaRPr>
+                    </a:p>
+                  </a:txBody>
+                  <a:tcPr marL="12700" marR="12700" marT="12700" marB="0" anchor="b"/>
+                </a:tc>
+                <a:tc>
+                  <a:txBody>
+                    <a:bodyPr/>
+                    <a:lstStyle/>
+                    <a:p>
+                      <a:pPr algn="ctr" fontAlgn="b"/>
+                      <a:r>
+                        <a:rPr lang="en-US" sz="2000" b="0" i="0" u="none" strike="noStrike" dirty="0" smtClean="0">
+                          <a:solidFill>
+                            <a:srgbClr val="000000"/>
+                          </a:solidFill>
+                          <a:effectLst/>
+                          <a:latin typeface="Calibri"/>
+                        </a:rPr>
+                        <a:t>1.9</a:t>
+                      </a:r>
+                      <a:endParaRPr lang="en-US" sz="2000" b="0" i="0" u="none" strike="noStrike" dirty="0">
+                        <a:solidFill>
+                          <a:srgbClr val="000000"/>
+                        </a:solidFill>
+                        <a:effectLst/>
+                        <a:latin typeface="Calibri"/>
+                      </a:endParaRPr>
+                    </a:p>
+                  </a:txBody>
+                  <a:tcPr marL="12700" marR="12700" marT="12700" marB="0" anchor="b"/>
+                </a:tc>
+                <a:tc>
+                  <a:txBody>
+                    <a:bodyPr/>
+                    <a:lstStyle/>
+                    <a:p>
+                      <a:pPr algn="ctr" fontAlgn="b"/>
+                      <a:endParaRPr lang="en-US" sz="2000" b="0" i="0" u="none" strike="noStrike" dirty="0">
+                        <a:solidFill>
+                          <a:srgbClr val="000000"/>
+                        </a:solidFill>
+                        <a:effectLst/>
+                        <a:latin typeface="Calibri"/>
+                      </a:endParaRPr>
+                    </a:p>
+                  </a:txBody>
+                  <a:tcPr marL="12700" marR="12700" marT="12700" marB="0" anchor="b"/>
+                </a:tc>
+              </a:tr>
+              <a:tr h="370840">
+                <a:tc>
+                  <a:txBody>
+                    <a:bodyPr/>
+                    <a:lstStyle/>
+                    <a:p>
+                      <a:pPr algn="ctr" fontAlgn="b"/>
+                      <a:r>
+                        <a:rPr lang="en-US" sz="2000" b="0" i="0" u="none" strike="noStrike" dirty="0">
+                          <a:solidFill>
+                            <a:srgbClr val="000000"/>
+                          </a:solidFill>
+                          <a:effectLst/>
+                          <a:latin typeface="Calibri"/>
+                        </a:rPr>
+                        <a:t>Grove2</a:t>
+                      </a:r>
+                    </a:p>
+                  </a:txBody>
+                  <a:tcPr marL="12700" marR="12700" marT="12700" marB="0" anchor="b"/>
+                </a:tc>
+                <a:tc>
+                  <a:txBody>
+                    <a:bodyPr/>
+                    <a:lstStyle/>
+                    <a:p>
+                      <a:pPr algn="ctr"/>
+                      <a:r>
+                        <a:rPr lang="en-US" sz="2000" dirty="0" smtClean="0"/>
+                        <a:t>210</a:t>
+                      </a:r>
+                      <a:endParaRPr lang="en-US" sz="2000" dirty="0"/>
+                    </a:p>
+                  </a:txBody>
+                  <a:tcPr/>
+                </a:tc>
+                <a:tc>
+                  <a:txBody>
+                    <a:bodyPr/>
+                    <a:lstStyle/>
+                    <a:p>
+                      <a:pPr algn="ctr"/>
+                      <a:r>
+                        <a:rPr lang="en-US" sz="2000" dirty="0" smtClean="0"/>
+                        <a:t>5.3</a:t>
+                      </a:r>
+                      <a:endParaRPr lang="en-US" sz="2000" dirty="0"/>
+                    </a:p>
+                  </a:txBody>
+                  <a:tcPr/>
+                </a:tc>
+                <a:tc>
+                  <a:txBody>
+                    <a:bodyPr/>
+                    <a:lstStyle/>
+                    <a:p>
+                      <a:pPr algn="ctr"/>
+                      <a:r>
+                        <a:rPr lang="en-US" sz="2000" dirty="0" smtClean="0"/>
+                        <a:t>0.4</a:t>
+                      </a:r>
+                      <a:endParaRPr lang="en-US" sz="2000" dirty="0"/>
+                    </a:p>
+                  </a:txBody>
+                  <a:tcPr/>
+                </a:tc>
+                <a:tc>
+                  <a:txBody>
+                    <a:bodyPr/>
+                    <a:lstStyle/>
+                    <a:p>
+                      <a:pPr algn="ctr" fontAlgn="b"/>
+                      <a:r>
+                        <a:rPr lang="en-US" sz="2000" b="0" i="0" u="none" strike="noStrike" dirty="0" smtClean="0">
+                          <a:solidFill>
+                            <a:srgbClr val="000000"/>
+                          </a:solidFill>
+                          <a:effectLst/>
+                          <a:latin typeface="Calibri"/>
+                        </a:rPr>
+                        <a:t>316</a:t>
+                      </a:r>
+                      <a:endParaRPr lang="en-US" sz="2000" b="0" i="0" u="none" strike="noStrike" dirty="0">
+                        <a:solidFill>
+                          <a:srgbClr val="000000"/>
+                        </a:solidFill>
+                        <a:effectLst/>
+                        <a:latin typeface="Calibri"/>
+                      </a:endParaRPr>
+                    </a:p>
+                  </a:txBody>
+                  <a:tcPr marL="12700" marR="12700" marT="12700" marB="0" anchor="b"/>
+                </a:tc>
+                <a:tc>
+                  <a:txBody>
+                    <a:bodyPr/>
+                    <a:lstStyle/>
+                    <a:p>
+                      <a:pPr algn="ctr" fontAlgn="b"/>
+                      <a:r>
+                        <a:rPr lang="en-US" sz="2000" b="0" i="0" u="none" strike="noStrike" dirty="0" smtClean="0">
+                          <a:solidFill>
+                            <a:srgbClr val="000000"/>
+                          </a:solidFill>
+                          <a:effectLst/>
+                          <a:latin typeface="Calibri"/>
+                        </a:rPr>
+                        <a:t>2.2</a:t>
+                      </a:r>
+                      <a:endParaRPr lang="en-US" sz="2000" b="0" i="0" u="none" strike="noStrike" dirty="0">
+                        <a:solidFill>
+                          <a:srgbClr val="000000"/>
+                        </a:solidFill>
+                        <a:effectLst/>
+                        <a:latin typeface="Calibri"/>
+                      </a:endParaRPr>
+                    </a:p>
+                  </a:txBody>
+                  <a:tcPr marL="12700" marR="12700" marT="12700" marB="0" anchor="b"/>
+                </a:tc>
+                <a:tc>
+                  <a:txBody>
+                    <a:bodyPr/>
+                    <a:lstStyle/>
+                    <a:p>
+                      <a:pPr algn="ctr" fontAlgn="b"/>
+                      <a:r>
+                        <a:rPr lang="en-US" sz="2000" b="0" i="0" u="none" strike="noStrike" dirty="0">
+                          <a:solidFill>
+                            <a:srgbClr val="000000"/>
+                          </a:solidFill>
+                          <a:effectLst/>
+                          <a:latin typeface="Calibri"/>
+                        </a:rPr>
+                        <a:t>0.149</a:t>
+                      </a:r>
+                    </a:p>
+                  </a:txBody>
+                  <a:tcPr marL="12700" marR="12700" marT="12700" marB="0" anchor="b"/>
+                </a:tc>
+              </a:tr>
+              <a:tr h="370840">
+                <a:tc>
+                  <a:txBody>
+                    <a:bodyPr/>
+                    <a:lstStyle/>
+                    <a:p>
+                      <a:pPr algn="ctr" fontAlgn="b"/>
+                      <a:r>
+                        <a:rPr lang="en-US" sz="2000" b="0" i="0" u="none" strike="noStrike" dirty="0">
+                          <a:solidFill>
+                            <a:srgbClr val="000000"/>
+                          </a:solidFill>
+                          <a:effectLst/>
+                          <a:latin typeface="Calibri"/>
+                        </a:rPr>
+                        <a:t>Grove3</a:t>
+                      </a:r>
+                    </a:p>
+                  </a:txBody>
+                  <a:tcPr marL="12700" marR="12700" marT="12700" marB="0" anchor="b"/>
+                </a:tc>
+                <a:tc>
+                  <a:txBody>
+                    <a:bodyPr/>
+                    <a:lstStyle/>
+                    <a:p>
+                      <a:pPr algn="ctr"/>
+                      <a:r>
+                        <a:rPr lang="en-US" sz="2000" dirty="0" smtClean="0"/>
+                        <a:t>311</a:t>
+                      </a:r>
+                      <a:endParaRPr lang="en-US" sz="2000" dirty="0"/>
+                    </a:p>
+                  </a:txBody>
+                  <a:tcPr/>
+                </a:tc>
+                <a:tc>
+                  <a:txBody>
+                    <a:bodyPr/>
+                    <a:lstStyle/>
+                    <a:p>
+                      <a:pPr algn="ctr"/>
+                      <a:r>
+                        <a:rPr lang="en-US" sz="2000" dirty="0" smtClean="0"/>
+                        <a:t>11.1</a:t>
+                      </a:r>
+                      <a:endParaRPr lang="en-US" sz="2000" dirty="0"/>
+                    </a:p>
+                  </a:txBody>
+                  <a:tcPr/>
+                </a:tc>
+                <a:tc>
+                  <a:txBody>
+                    <a:bodyPr/>
+                    <a:lstStyle/>
+                    <a:p>
+                      <a:pPr algn="ctr"/>
+                      <a:r>
+                        <a:rPr lang="en-US" sz="2000" dirty="0" smtClean="0"/>
+                        <a:t>1.1</a:t>
+                      </a:r>
+                      <a:endParaRPr lang="en-US" sz="2000" dirty="0"/>
+                    </a:p>
+                  </a:txBody>
+                  <a:tcPr/>
+                </a:tc>
+                <a:tc>
+                  <a:txBody>
+                    <a:bodyPr/>
+                    <a:lstStyle/>
+                    <a:p>
+                      <a:pPr algn="ctr" fontAlgn="b"/>
+                      <a:r>
+                        <a:rPr lang="en-US" sz="2000" b="0" i="0" u="none" strike="noStrike" dirty="0" smtClean="0">
+                          <a:solidFill>
+                            <a:srgbClr val="000000"/>
+                          </a:solidFill>
+                          <a:effectLst/>
+                          <a:latin typeface="Calibri"/>
+                        </a:rPr>
+                        <a:t>312</a:t>
+                      </a:r>
+                      <a:endParaRPr lang="en-US" sz="2000" b="0" i="0" u="none" strike="noStrike" dirty="0">
+                        <a:solidFill>
+                          <a:srgbClr val="000000"/>
+                        </a:solidFill>
+                        <a:effectLst/>
+                        <a:latin typeface="Calibri"/>
+                      </a:endParaRPr>
+                    </a:p>
+                  </a:txBody>
+                  <a:tcPr marL="12700" marR="12700" marT="12700" marB="0" anchor="b"/>
+                </a:tc>
+                <a:tc>
+                  <a:txBody>
+                    <a:bodyPr/>
+                    <a:lstStyle/>
+                    <a:p>
+                      <a:pPr algn="ctr" fontAlgn="b"/>
+                      <a:r>
+                        <a:rPr lang="en-US" sz="2000" b="0" i="0" u="none" strike="noStrike" dirty="0" smtClean="0">
+                          <a:solidFill>
+                            <a:srgbClr val="000000"/>
+                          </a:solidFill>
+                          <a:effectLst/>
+                          <a:latin typeface="Calibri"/>
+                        </a:rPr>
+                        <a:t>6.3</a:t>
+                      </a:r>
+                      <a:endParaRPr lang="en-US" sz="2000" b="0" i="0" u="none" strike="noStrike" dirty="0">
+                        <a:solidFill>
+                          <a:srgbClr val="000000"/>
+                        </a:solidFill>
+                        <a:effectLst/>
+                        <a:latin typeface="Calibri"/>
+                      </a:endParaRPr>
+                    </a:p>
+                  </a:txBody>
+                  <a:tcPr marL="12700" marR="12700" marT="12700" marB="0" anchor="b"/>
+                </a:tc>
+                <a:tc>
+                  <a:txBody>
+                    <a:bodyPr/>
+                    <a:lstStyle/>
+                    <a:p>
+                      <a:pPr algn="ctr" fontAlgn="b"/>
+                      <a:r>
+                        <a:rPr lang="en-US" sz="2000" b="0" i="0" u="none" strike="noStrike" dirty="0">
+                          <a:solidFill>
+                            <a:srgbClr val="000000"/>
+                          </a:solidFill>
+                          <a:effectLst/>
+                          <a:latin typeface="Calibri"/>
+                        </a:rPr>
+                        <a:t>0.662</a:t>
+                      </a:r>
+                    </a:p>
+                  </a:txBody>
+                  <a:tcPr marL="12700" marR="12700" marT="12700" marB="0" anchor="b"/>
+                </a:tc>
+              </a:tr>
+              <a:tr h="370840">
+                <a:tc>
+                  <a:txBody>
+                    <a:bodyPr/>
+                    <a:lstStyle/>
+                    <a:p>
+                      <a:pPr algn="ctr" fontAlgn="b"/>
+                      <a:r>
+                        <a:rPr lang="en-US" sz="2000" b="0" i="0" u="none" strike="noStrike" dirty="0">
+                          <a:solidFill>
+                            <a:srgbClr val="000000"/>
+                          </a:solidFill>
+                          <a:effectLst/>
+                          <a:latin typeface="Calibri"/>
+                        </a:rPr>
+                        <a:t>Hydrangea</a:t>
+                      </a:r>
+                    </a:p>
+                  </a:txBody>
+                  <a:tcPr marL="12700" marR="12700" marT="12700" marB="0" anchor="b"/>
+                </a:tc>
+                <a:tc>
+                  <a:txBody>
+                    <a:bodyPr/>
+                    <a:lstStyle/>
+                    <a:p>
+                      <a:pPr algn="ctr"/>
+                      <a:r>
+                        <a:rPr lang="en-US" sz="2000" dirty="0" smtClean="0"/>
+                        <a:t>160</a:t>
+                      </a:r>
+                      <a:endParaRPr lang="en-US" sz="2000" dirty="0"/>
+                    </a:p>
+                  </a:txBody>
+                  <a:tcPr/>
+                </a:tc>
+                <a:tc>
+                  <a:txBody>
+                    <a:bodyPr/>
+                    <a:lstStyle/>
+                    <a:p>
+                      <a:pPr algn="ctr"/>
+                      <a:r>
+                        <a:rPr lang="en-US" sz="2000" dirty="0" smtClean="0"/>
+                        <a:t>8.7</a:t>
+                      </a:r>
+                      <a:endParaRPr lang="en-US" sz="2000" dirty="0"/>
+                    </a:p>
+                  </a:txBody>
+                  <a:tcPr/>
+                </a:tc>
+                <a:tc>
+                  <a:txBody>
+                    <a:bodyPr/>
+                    <a:lstStyle/>
+                    <a:p>
+                      <a:pPr algn="ctr"/>
+                      <a:endParaRPr lang="en-US" sz="2000" dirty="0"/>
+                    </a:p>
+                  </a:txBody>
+                  <a:tcPr/>
+                </a:tc>
+                <a:tc>
+                  <a:txBody>
+                    <a:bodyPr/>
+                    <a:lstStyle/>
+                    <a:p>
+                      <a:pPr algn="ctr" fontAlgn="b"/>
+                      <a:r>
+                        <a:rPr lang="en-US" sz="2000" b="0" i="0" u="none" strike="noStrike" dirty="0" smtClean="0">
+                          <a:solidFill>
+                            <a:srgbClr val="000000"/>
+                          </a:solidFill>
+                          <a:effectLst/>
+                          <a:latin typeface="Calibri"/>
+                        </a:rPr>
+                        <a:t>217</a:t>
+                      </a:r>
+                      <a:endParaRPr lang="en-US" sz="2000" b="0" i="0" u="none" strike="noStrike" dirty="0">
+                        <a:solidFill>
+                          <a:srgbClr val="000000"/>
+                        </a:solidFill>
+                        <a:effectLst/>
+                        <a:latin typeface="Calibri"/>
+                      </a:endParaRPr>
+                    </a:p>
+                  </a:txBody>
+                  <a:tcPr marL="12700" marR="12700" marT="12700" marB="0" anchor="b"/>
+                </a:tc>
+                <a:tc>
+                  <a:txBody>
+                    <a:bodyPr/>
+                    <a:lstStyle/>
+                    <a:p>
+                      <a:pPr algn="ctr" fontAlgn="b"/>
+                      <a:r>
+                        <a:rPr lang="en-US" sz="2000" b="0" i="0" u="none" strike="noStrike" dirty="0" smtClean="0">
+                          <a:solidFill>
+                            <a:srgbClr val="000000"/>
+                          </a:solidFill>
+                          <a:effectLst/>
+                          <a:latin typeface="Calibri"/>
+                        </a:rPr>
+                        <a:t>6.8</a:t>
+                      </a:r>
+                      <a:endParaRPr lang="en-US" sz="2000" b="0" i="0" u="none" strike="noStrike" dirty="0">
+                        <a:solidFill>
+                          <a:srgbClr val="000000"/>
+                        </a:solidFill>
+                        <a:effectLst/>
+                        <a:latin typeface="Calibri"/>
+                      </a:endParaRPr>
+                    </a:p>
+                  </a:txBody>
+                  <a:tcPr marL="12700" marR="12700" marT="12700" marB="0" anchor="b"/>
+                </a:tc>
+                <a:tc>
+                  <a:txBody>
+                    <a:bodyPr/>
+                    <a:lstStyle/>
+                    <a:p>
+                      <a:pPr algn="ctr" fontAlgn="b"/>
+                      <a:endParaRPr lang="en-US" sz="2000" b="0" i="0" u="none" strike="noStrike" dirty="0">
+                        <a:solidFill>
+                          <a:srgbClr val="000000"/>
+                        </a:solidFill>
+                        <a:effectLst/>
+                        <a:latin typeface="Calibri"/>
+                      </a:endParaRPr>
+                    </a:p>
+                  </a:txBody>
+                  <a:tcPr marL="12700" marR="12700" marT="12700" marB="0" anchor="b"/>
+                </a:tc>
+              </a:tr>
+              <a:tr h="370840">
+                <a:tc>
+                  <a:txBody>
+                    <a:bodyPr/>
+                    <a:lstStyle/>
+                    <a:p>
+                      <a:pPr algn="ctr" fontAlgn="b"/>
+                      <a:r>
+                        <a:rPr lang="en-US" sz="2000" b="0" i="0" u="none" strike="noStrike">
+                          <a:solidFill>
+                            <a:srgbClr val="000000"/>
+                          </a:solidFill>
+                          <a:effectLst/>
+                          <a:latin typeface="Calibri"/>
+                        </a:rPr>
+                        <a:t>RubberWhale</a:t>
+                      </a:r>
+                    </a:p>
+                  </a:txBody>
+                  <a:tcPr marL="12700" marR="12700" marT="12700" marB="0" anchor="b"/>
+                </a:tc>
+                <a:tc>
+                  <a:txBody>
+                    <a:bodyPr/>
+                    <a:lstStyle/>
+                    <a:p>
+                      <a:pPr algn="ctr"/>
+                      <a:r>
+                        <a:rPr lang="en-US" sz="2000" dirty="0" smtClean="0"/>
+                        <a:t>131</a:t>
+                      </a:r>
+                      <a:endParaRPr lang="en-US" sz="2000" dirty="0"/>
+                    </a:p>
+                  </a:txBody>
+                  <a:tcPr/>
+                </a:tc>
+                <a:tc>
+                  <a:txBody>
+                    <a:bodyPr/>
+                    <a:lstStyle/>
+                    <a:p>
+                      <a:pPr algn="ctr"/>
+                      <a:r>
+                        <a:rPr lang="en-US" sz="2000" dirty="0" smtClean="0"/>
+                        <a:t>5.6</a:t>
+                      </a:r>
+                      <a:endParaRPr lang="en-US" sz="2000" dirty="0"/>
+                    </a:p>
+                  </a:txBody>
+                  <a:tcPr/>
+                </a:tc>
+                <a:tc>
+                  <a:txBody>
+                    <a:bodyPr/>
+                    <a:lstStyle/>
+                    <a:p>
+                      <a:pPr algn="ctr"/>
+                      <a:endParaRPr lang="en-US" sz="2000" dirty="0"/>
+                    </a:p>
+                  </a:txBody>
+                  <a:tcPr/>
+                </a:tc>
+                <a:tc>
+                  <a:txBody>
+                    <a:bodyPr/>
+                    <a:lstStyle/>
+                    <a:p>
+                      <a:pPr algn="ctr" fontAlgn="b"/>
+                      <a:r>
+                        <a:rPr lang="en-US" sz="2000" b="0" i="0" u="none" strike="noStrike" dirty="0" smtClean="0">
+                          <a:solidFill>
+                            <a:srgbClr val="000000"/>
+                          </a:solidFill>
+                          <a:effectLst/>
+                          <a:latin typeface="Calibri"/>
+                        </a:rPr>
+                        <a:t>210</a:t>
+                      </a:r>
+                      <a:endParaRPr lang="en-US" sz="2000" b="0" i="0" u="none" strike="noStrike" dirty="0">
+                        <a:solidFill>
+                          <a:srgbClr val="000000"/>
+                        </a:solidFill>
+                        <a:effectLst/>
+                        <a:latin typeface="Calibri"/>
+                      </a:endParaRPr>
+                    </a:p>
+                  </a:txBody>
+                  <a:tcPr marL="12700" marR="12700" marT="12700" marB="0" anchor="b"/>
+                </a:tc>
+                <a:tc>
+                  <a:txBody>
+                    <a:bodyPr/>
+                    <a:lstStyle/>
+                    <a:p>
+                      <a:pPr algn="ctr" fontAlgn="b"/>
+                      <a:r>
+                        <a:rPr lang="en-US" sz="2000" b="0" i="0" u="none" strike="noStrike" dirty="0" smtClean="0">
+                          <a:solidFill>
+                            <a:srgbClr val="000000"/>
+                          </a:solidFill>
+                          <a:effectLst/>
+                          <a:latin typeface="Calibri"/>
+                        </a:rPr>
+                        <a:t>3.8</a:t>
+                      </a:r>
+                      <a:endParaRPr lang="en-US" sz="2000" b="0" i="0" u="none" strike="noStrike" dirty="0">
+                        <a:solidFill>
+                          <a:srgbClr val="000000"/>
+                        </a:solidFill>
+                        <a:effectLst/>
+                        <a:latin typeface="Calibri"/>
+                      </a:endParaRPr>
+                    </a:p>
+                  </a:txBody>
+                  <a:tcPr marL="12700" marR="12700" marT="12700" marB="0" anchor="b"/>
+                </a:tc>
+                <a:tc>
+                  <a:txBody>
+                    <a:bodyPr/>
+                    <a:lstStyle/>
+                    <a:p>
+                      <a:pPr algn="ctr" fontAlgn="b"/>
+                      <a:endParaRPr lang="en-US" sz="2000" b="0" i="0" u="none" strike="noStrike" dirty="0">
+                        <a:solidFill>
+                          <a:srgbClr val="000000"/>
+                        </a:solidFill>
+                        <a:effectLst/>
+                        <a:latin typeface="Calibri"/>
+                      </a:endParaRPr>
+                    </a:p>
+                  </a:txBody>
+                  <a:tcPr marL="12700" marR="12700" marT="12700" marB="0" anchor="b"/>
+                </a:tc>
+              </a:tr>
+              <a:tr h="370840">
+                <a:tc>
+                  <a:txBody>
+                    <a:bodyPr/>
+                    <a:lstStyle/>
+                    <a:p>
+                      <a:pPr algn="ctr" fontAlgn="b"/>
+                      <a:r>
+                        <a:rPr lang="en-US" sz="2000" b="0" i="0" u="none" strike="noStrike" dirty="0" smtClean="0">
+                          <a:solidFill>
+                            <a:srgbClr val="000000"/>
+                          </a:solidFill>
+                          <a:effectLst/>
+                          <a:latin typeface="Calibri"/>
+                        </a:rPr>
+                        <a:t>Venus</a:t>
+                      </a:r>
+                      <a:endParaRPr lang="en-US" sz="2000" b="0" i="0" u="none" strike="noStrike" dirty="0">
+                        <a:solidFill>
+                          <a:srgbClr val="000000"/>
+                        </a:solidFill>
+                        <a:effectLst/>
+                        <a:latin typeface="Calibri"/>
+                      </a:endParaRPr>
+                    </a:p>
+                  </a:txBody>
+                  <a:tcPr marL="12700" marR="12700" marT="12700" marB="0" anchor="b"/>
+                </a:tc>
+                <a:tc>
+                  <a:txBody>
+                    <a:bodyPr/>
+                    <a:lstStyle/>
+                    <a:p>
+                      <a:pPr algn="ctr"/>
+                      <a:r>
+                        <a:rPr lang="en-US" sz="2000" dirty="0" smtClean="0"/>
+                        <a:t>84</a:t>
+                      </a:r>
+                      <a:endParaRPr lang="en-US" sz="2000" dirty="0"/>
+                    </a:p>
+                  </a:txBody>
+                  <a:tcPr/>
+                </a:tc>
+                <a:tc>
+                  <a:txBody>
+                    <a:bodyPr/>
+                    <a:lstStyle/>
+                    <a:p>
+                      <a:pPr algn="ctr"/>
+                      <a:r>
+                        <a:rPr lang="en-US" sz="2000" dirty="0" smtClean="0"/>
+                        <a:t>15.4</a:t>
+                      </a:r>
+                      <a:endParaRPr lang="en-US" sz="2000" dirty="0"/>
+                    </a:p>
+                  </a:txBody>
+                  <a:tcPr/>
+                </a:tc>
+                <a:tc>
+                  <a:txBody>
+                    <a:bodyPr/>
+                    <a:lstStyle/>
+                    <a:p>
+                      <a:pPr algn="ctr"/>
+                      <a:endParaRPr lang="en-US" sz="2000" dirty="0"/>
+                    </a:p>
+                  </a:txBody>
+                  <a:tcPr/>
+                </a:tc>
+                <a:tc>
+                  <a:txBody>
+                    <a:bodyPr/>
+                    <a:lstStyle/>
+                    <a:p>
+                      <a:pPr algn="ctr" fontAlgn="b"/>
+                      <a:r>
+                        <a:rPr lang="en-US" sz="2000" b="0" i="0" u="none" strike="noStrike" dirty="0" smtClean="0">
+                          <a:solidFill>
+                            <a:srgbClr val="000000"/>
+                          </a:solidFill>
+                          <a:effectLst/>
+                          <a:latin typeface="Calibri"/>
+                        </a:rPr>
+                        <a:t>139</a:t>
+                      </a:r>
+                      <a:endParaRPr lang="en-US" sz="2000" b="0" i="0" u="none" strike="noStrike" dirty="0">
+                        <a:solidFill>
+                          <a:srgbClr val="000000"/>
+                        </a:solidFill>
+                        <a:effectLst/>
+                        <a:latin typeface="Calibri"/>
+                      </a:endParaRPr>
+                    </a:p>
+                  </a:txBody>
+                  <a:tcPr marL="12700" marR="12700" marT="12700" marB="0" anchor="b"/>
+                </a:tc>
+                <a:tc>
+                  <a:txBody>
+                    <a:bodyPr/>
+                    <a:lstStyle/>
+                    <a:p>
+                      <a:pPr algn="ctr" fontAlgn="b"/>
+                      <a:r>
+                        <a:rPr lang="en-US" sz="2000" b="0" i="0" u="none" strike="noStrike" dirty="0" smtClean="0">
+                          <a:solidFill>
+                            <a:srgbClr val="000000"/>
+                          </a:solidFill>
+                          <a:effectLst/>
+                          <a:latin typeface="Calibri"/>
+                        </a:rPr>
+                        <a:t>4.4</a:t>
+                      </a:r>
+                      <a:endParaRPr lang="en-US" sz="2000" b="0" i="0" u="none" strike="noStrike" dirty="0">
+                        <a:solidFill>
+                          <a:srgbClr val="000000"/>
+                        </a:solidFill>
+                        <a:effectLst/>
+                        <a:latin typeface="Calibri"/>
+                      </a:endParaRPr>
+                    </a:p>
+                  </a:txBody>
+                  <a:tcPr marL="12700" marR="12700" marT="12700" marB="0" anchor="b"/>
+                </a:tc>
+                <a:tc>
+                  <a:txBody>
+                    <a:bodyPr/>
+                    <a:lstStyle/>
+                    <a:p>
+                      <a:pPr algn="ctr"/>
+                      <a:endParaRPr lang="en-US" sz="2000" dirty="0"/>
+                    </a:p>
+                  </a:txBody>
+                  <a:tcPr marL="12700" marR="12700" marT="12700" marB="0" anchor="b"/>
+                </a:tc>
+              </a:tr>
+              <a:tr h="370840">
+                <a:tc>
+                  <a:txBody>
+                    <a:bodyPr/>
+                    <a:lstStyle/>
+                    <a:p>
+                      <a:pPr algn="ctr" fontAlgn="b"/>
+                      <a:r>
+                        <a:rPr lang="en-US" sz="2000" b="0" i="0" u="none" strike="noStrike" dirty="0" smtClean="0">
+                          <a:solidFill>
+                            <a:srgbClr val="000000"/>
+                          </a:solidFill>
+                          <a:effectLst/>
+                          <a:latin typeface="Calibri"/>
+                        </a:rPr>
+                        <a:t>Urban2</a:t>
+                      </a:r>
+                      <a:endParaRPr lang="en-US" sz="2000" b="0" i="0" u="none" strike="noStrike" dirty="0">
+                        <a:solidFill>
+                          <a:srgbClr val="000000"/>
+                        </a:solidFill>
+                        <a:effectLst/>
+                        <a:latin typeface="Calibri"/>
+                      </a:endParaRPr>
+                    </a:p>
+                  </a:txBody>
+                  <a:tcPr marL="12700" marR="12700" marT="12700" marB="0" anchor="b">
+                    <a:solidFill>
+                      <a:srgbClr val="FF0000"/>
+                    </a:solidFill>
+                  </a:tcPr>
+                </a:tc>
+                <a:tc>
+                  <a:txBody>
+                    <a:bodyPr/>
+                    <a:lstStyle/>
+                    <a:p>
+                      <a:pPr algn="ctr"/>
+                      <a:r>
+                        <a:rPr lang="en-US" sz="2000" dirty="0" smtClean="0"/>
+                        <a:t>342</a:t>
+                      </a:r>
+                      <a:endParaRPr lang="en-US" sz="2000" dirty="0"/>
+                    </a:p>
+                  </a:txBody>
+                  <a:tcPr>
+                    <a:solidFill>
+                      <a:srgbClr val="FF0000"/>
+                    </a:solidFill>
+                  </a:tcPr>
+                </a:tc>
+                <a:tc>
+                  <a:txBody>
+                    <a:bodyPr/>
+                    <a:lstStyle/>
+                    <a:p>
+                      <a:pPr algn="ctr"/>
+                      <a:r>
+                        <a:rPr lang="en-US" sz="2000" dirty="0" smtClean="0"/>
+                        <a:t>27.2</a:t>
+                      </a:r>
+                      <a:endParaRPr lang="en-US" sz="2000" dirty="0"/>
+                    </a:p>
+                  </a:txBody>
+                  <a:tcPr>
+                    <a:solidFill>
+                      <a:srgbClr val="FF0000"/>
+                    </a:solidFill>
+                  </a:tcPr>
+                </a:tc>
+                <a:tc>
+                  <a:txBody>
+                    <a:bodyPr/>
+                    <a:lstStyle/>
+                    <a:p>
+                      <a:pPr algn="ctr"/>
+                      <a:r>
+                        <a:rPr lang="en-US" sz="2000" dirty="0" smtClean="0"/>
+                        <a:t>6.4</a:t>
+                      </a:r>
+                      <a:endParaRPr lang="en-US" sz="2000" dirty="0"/>
+                    </a:p>
+                  </a:txBody>
+                  <a:tcPr>
+                    <a:solidFill>
+                      <a:srgbClr val="FF0000"/>
+                    </a:solidFill>
+                  </a:tcPr>
+                </a:tc>
+                <a:tc>
+                  <a:txBody>
+                    <a:bodyPr/>
+                    <a:lstStyle/>
+                    <a:p>
+                      <a:pPr algn="ctr" fontAlgn="b"/>
+                      <a:r>
+                        <a:rPr lang="en-US" sz="2000" b="0" i="0" u="none" strike="noStrike" dirty="0" smtClean="0">
+                          <a:solidFill>
+                            <a:srgbClr val="000000"/>
+                          </a:solidFill>
+                          <a:effectLst/>
+                          <a:latin typeface="Calibri"/>
+                        </a:rPr>
+                        <a:t>306</a:t>
+                      </a:r>
+                      <a:endParaRPr lang="en-US" sz="2000" b="0" i="0" u="none" strike="noStrike" dirty="0">
+                        <a:solidFill>
+                          <a:srgbClr val="000000"/>
+                        </a:solidFill>
+                        <a:effectLst/>
+                        <a:latin typeface="Calibri"/>
+                      </a:endParaRPr>
+                    </a:p>
+                  </a:txBody>
+                  <a:tcPr marL="12700" marR="12700" marT="12700" marB="0" anchor="b">
+                    <a:solidFill>
+                      <a:srgbClr val="FF0000"/>
+                    </a:solidFill>
+                  </a:tcPr>
+                </a:tc>
+                <a:tc>
+                  <a:txBody>
+                    <a:bodyPr/>
+                    <a:lstStyle/>
+                    <a:p>
+                      <a:pPr algn="ctr" fontAlgn="b"/>
+                      <a:r>
+                        <a:rPr lang="en-US" sz="2000" b="0" i="0" u="none" strike="noStrike" dirty="0" smtClean="0">
+                          <a:solidFill>
+                            <a:srgbClr val="000000"/>
+                          </a:solidFill>
+                          <a:effectLst/>
+                          <a:latin typeface="Calibri"/>
+                        </a:rPr>
+                        <a:t>3.0</a:t>
+                      </a:r>
+                      <a:endParaRPr lang="en-US" sz="2000" b="0" i="0" u="none" strike="noStrike" dirty="0">
+                        <a:solidFill>
+                          <a:srgbClr val="000000"/>
+                        </a:solidFill>
+                        <a:effectLst/>
+                        <a:latin typeface="Calibri"/>
+                      </a:endParaRPr>
+                    </a:p>
+                  </a:txBody>
+                  <a:tcPr marL="12700" marR="12700" marT="12700" marB="0" anchor="b">
+                    <a:solidFill>
+                      <a:srgbClr val="FF0000"/>
+                    </a:solidFill>
+                  </a:tcPr>
+                </a:tc>
+                <a:tc>
+                  <a:txBody>
+                    <a:bodyPr/>
+                    <a:lstStyle/>
+                    <a:p>
+                      <a:pPr algn="ctr" fontAlgn="b"/>
+                      <a:r>
+                        <a:rPr lang="en-US" sz="2000" b="0" i="0" u="none" strike="noStrike" dirty="0">
+                          <a:solidFill>
+                            <a:srgbClr val="000000"/>
+                          </a:solidFill>
+                          <a:effectLst/>
+                          <a:latin typeface="Calibri"/>
+                        </a:rPr>
+                        <a:t>0.414</a:t>
+                      </a:r>
+                    </a:p>
+                  </a:txBody>
+                  <a:tcPr marL="12700" marR="12700" marT="12700" marB="0" anchor="b">
+                    <a:solidFill>
+                      <a:srgbClr val="FF0000"/>
+                    </a:solidFill>
+                  </a:tcPr>
+                </a:tc>
+              </a:tr>
+              <a:tr h="370840">
+                <a:tc>
+                  <a:txBody>
+                    <a:bodyPr/>
+                    <a:lstStyle/>
+                    <a:p>
+                      <a:pPr algn="ctr" fontAlgn="b"/>
+                      <a:r>
+                        <a:rPr lang="en-US" sz="2000" b="0" i="0" u="none" strike="noStrike" dirty="0" smtClean="0">
+                          <a:solidFill>
+                            <a:srgbClr val="000000"/>
+                          </a:solidFill>
+                          <a:effectLst/>
+                          <a:latin typeface="Calibri"/>
+                        </a:rPr>
+                        <a:t>Urban3</a:t>
+                      </a:r>
+                      <a:endParaRPr lang="en-US" sz="2000" b="0" i="0" u="none" strike="noStrike" dirty="0">
+                        <a:solidFill>
+                          <a:srgbClr val="000000"/>
+                        </a:solidFill>
+                        <a:effectLst/>
+                        <a:latin typeface="Calibri"/>
+                      </a:endParaRPr>
+                    </a:p>
+                  </a:txBody>
+                  <a:tcPr marL="12700" marR="12700" marT="12700" marB="0" anchor="b">
+                    <a:solidFill>
+                      <a:srgbClr val="FF0000"/>
+                    </a:solidFill>
+                  </a:tcPr>
+                </a:tc>
+                <a:tc>
+                  <a:txBody>
+                    <a:bodyPr/>
+                    <a:lstStyle/>
+                    <a:p>
+                      <a:pPr algn="ctr"/>
+                      <a:r>
+                        <a:rPr lang="en-US" sz="2000" dirty="0" smtClean="0"/>
+                        <a:t>370</a:t>
+                      </a:r>
+                      <a:endParaRPr lang="en-US" sz="2000" dirty="0"/>
+                    </a:p>
+                  </a:txBody>
+                  <a:tcPr>
+                    <a:solidFill>
+                      <a:srgbClr val="FF0000"/>
+                    </a:solidFill>
+                  </a:tcPr>
+                </a:tc>
+                <a:tc>
+                  <a:txBody>
+                    <a:bodyPr/>
+                    <a:lstStyle/>
+                    <a:p>
+                      <a:pPr algn="ctr"/>
+                      <a:r>
+                        <a:rPr lang="en-US" sz="2000" dirty="0" smtClean="0"/>
+                        <a:t>51.0</a:t>
+                      </a:r>
+                      <a:endParaRPr lang="en-US" sz="2000" dirty="0"/>
+                    </a:p>
+                  </a:txBody>
+                  <a:tcPr>
+                    <a:solidFill>
+                      <a:srgbClr val="FF0000"/>
+                    </a:solidFill>
+                  </a:tcPr>
+                </a:tc>
+                <a:tc>
+                  <a:txBody>
+                    <a:bodyPr/>
+                    <a:lstStyle/>
+                    <a:p>
+                      <a:pPr algn="ctr"/>
+                      <a:r>
+                        <a:rPr lang="en-US" sz="2000" dirty="0" smtClean="0"/>
+                        <a:t>6.2</a:t>
+                      </a:r>
+                      <a:endParaRPr lang="en-US" sz="2000" dirty="0"/>
+                    </a:p>
+                  </a:txBody>
+                  <a:tcPr>
+                    <a:solidFill>
+                      <a:srgbClr val="FF0000"/>
+                    </a:solidFill>
+                  </a:tcPr>
+                </a:tc>
+                <a:tc>
+                  <a:txBody>
+                    <a:bodyPr/>
+                    <a:lstStyle/>
+                    <a:p>
+                      <a:pPr algn="ctr" fontAlgn="b"/>
+                      <a:r>
+                        <a:rPr lang="en-US" sz="2000" b="0" i="0" u="none" strike="noStrike" dirty="0" smtClean="0">
+                          <a:solidFill>
+                            <a:srgbClr val="000000"/>
+                          </a:solidFill>
+                          <a:effectLst/>
+                          <a:latin typeface="Calibri"/>
+                        </a:rPr>
+                        <a:t>304</a:t>
+                      </a:r>
+                      <a:endParaRPr lang="en-US" sz="2000" b="0" i="0" u="none" strike="noStrike" dirty="0">
+                        <a:solidFill>
+                          <a:srgbClr val="000000"/>
+                        </a:solidFill>
+                        <a:effectLst/>
+                        <a:latin typeface="Calibri"/>
+                      </a:endParaRPr>
+                    </a:p>
+                  </a:txBody>
+                  <a:tcPr marL="12700" marR="12700" marT="12700" marB="0" anchor="b">
+                    <a:solidFill>
+                      <a:srgbClr val="FF0000"/>
+                    </a:solidFill>
+                  </a:tcPr>
+                </a:tc>
+                <a:tc>
+                  <a:txBody>
+                    <a:bodyPr/>
+                    <a:lstStyle/>
+                    <a:p>
+                      <a:pPr algn="ctr" fontAlgn="b"/>
+                      <a:r>
+                        <a:rPr lang="en-US" sz="2000" b="0" i="0" u="none" strike="noStrike" dirty="0" smtClean="0">
+                          <a:solidFill>
+                            <a:srgbClr val="000000"/>
+                          </a:solidFill>
+                          <a:effectLst/>
+                          <a:latin typeface="Calibri"/>
+                        </a:rPr>
+                        <a:t>8.1</a:t>
+                      </a:r>
+                      <a:endParaRPr lang="en-US" sz="2000" b="0" i="0" u="none" strike="noStrike" dirty="0">
+                        <a:solidFill>
+                          <a:srgbClr val="000000"/>
+                        </a:solidFill>
+                        <a:effectLst/>
+                        <a:latin typeface="Calibri"/>
+                      </a:endParaRPr>
+                    </a:p>
+                  </a:txBody>
+                  <a:tcPr marL="12700" marR="12700" marT="12700" marB="0" anchor="b">
+                    <a:solidFill>
+                      <a:srgbClr val="FF0000"/>
+                    </a:solidFill>
+                  </a:tcPr>
+                </a:tc>
+                <a:tc>
+                  <a:txBody>
+                    <a:bodyPr/>
+                    <a:lstStyle/>
+                    <a:p>
+                      <a:pPr algn="ctr" fontAlgn="b"/>
+                      <a:r>
+                        <a:rPr lang="en-US" sz="2000" b="0" i="0" u="none" strike="noStrike" dirty="0">
+                          <a:solidFill>
+                            <a:srgbClr val="000000"/>
+                          </a:solidFill>
+                          <a:effectLst/>
+                          <a:latin typeface="Calibri"/>
+                        </a:rPr>
+                        <a:t>1.003</a:t>
+                      </a:r>
+                    </a:p>
+                  </a:txBody>
+                  <a:tcPr marL="12700" marR="12700" marT="12700" marB="0" anchor="b">
+                    <a:solidFill>
+                      <a:srgbClr val="FF0000"/>
+                    </a:solidFill>
+                  </a:tcPr>
+                </a:tc>
+              </a:tr>
+            </a:tbl>
+          </a:graphicData>
+        </a:graphic>
+      </p:graphicFrame>
+      <p:sp>
+        <p:nvSpPr>
+          <p:cNvPr id="5" name="Rectangle 4"/>
+          <p:cNvSpPr/>
+          <p:nvPr/>
+        </p:nvSpPr>
+        <p:spPr>
+          <a:xfrm>
+            <a:off x="720766" y="5911010"/>
+            <a:ext cx="7539438" cy="881028"/>
+          </a:xfrm>
+          <a:prstGeom prst="rect">
+            <a:avLst/>
+          </a:prstGeom>
+          <a:noFill/>
+          <a:ln w="28575" cmpd="sng">
+            <a:solidFill>
+              <a:srgbClr val="FF0000"/>
+            </a:solidFill>
+          </a:ln>
+          <a:effectLst/>
+        </p:spPr>
+        <p:style>
+          <a:lnRef idx="1">
+            <a:schemeClr val="accent1"/>
+          </a:lnRef>
+          <a:fillRef idx="3">
+            <a:schemeClr val="accent1"/>
+          </a:fillRef>
+          <a:effectRef idx="2">
+            <a:schemeClr val="accent1"/>
+          </a:effectRef>
+          <a:fontRef idx="minor">
+            <a:schemeClr val="lt1"/>
+          </a:fontRef>
+        </p:style>
+        <p:txBody>
+          <a:bodyPr rtlCol="0" anchor="ctr"/>
+          <a:lstStyle/>
+          <a:p>
+            <a:r>
+              <a:rPr lang="en-US" sz="2400" dirty="0" smtClean="0">
+                <a:solidFill>
+                  <a:schemeClr val="tx1"/>
+                </a:solidFill>
+              </a:rPr>
+              <a:t> </a:t>
+            </a:r>
+          </a:p>
+          <a:p>
+            <a:r>
+              <a:rPr lang="en-US" sz="2400" dirty="0" smtClean="0">
+                <a:solidFill>
+                  <a:schemeClr val="tx1"/>
+                </a:solidFill>
+              </a:rPr>
+              <a:t>Weighted median filter slows down optical flow estimation without significant gain. </a:t>
+            </a:r>
+            <a:endParaRPr lang="en-US" sz="2400" dirty="0">
+              <a:solidFill>
+                <a:schemeClr val="tx1"/>
+              </a:solidFill>
+            </a:endParaRPr>
+          </a:p>
+          <a:p>
+            <a:endParaRPr lang="en-US" sz="2400" dirty="0">
+              <a:solidFill>
+                <a:schemeClr val="tx1"/>
+              </a:solidFill>
+            </a:endParaRPr>
+          </a:p>
+        </p:txBody>
+      </p:sp>
+    </p:spTree>
+    <p:extLst>
+      <p:ext uri="{BB962C8B-B14F-4D97-AF65-F5344CB8AC3E}">
+        <p14:creationId xmlns:p14="http://schemas.microsoft.com/office/powerpoint/2010/main" val="3966672602"/>
+      </p:ext>
+    </p:extLst>
+  </p:cSld>
+  <p:clrMapOvr>
+    <a:masterClrMapping/>
+  </p:clrMapOvr>
+</p:sld>
+</file>
+
+<file path=ppt/slides/slide9.xml><?xml version="1.0" encoding="utf-8"?>
+<p:sld xmlns:a="http://schemas.openxmlformats.org/drawingml/2006/main" xmlns:r="http://schemas.openxmlformats.org/officeDocument/2006/relationships" xmlns:p="http://schemas.openxmlformats.org/presentationml/2006/main">
+  <p:cSld>
+    <p:spTree>
+      <p:nvGrpSpPr>
+        <p:cNvPr id="1" name=""/>
+        <p:cNvGrpSpPr/>
+        <p:nvPr/>
+      </p:nvGrpSpPr>
+      <p:grpSpPr>
+        <a:xfrm>
+          <a:off x="0" y="0"/>
+          <a:ext cx="0" cy="0"/>
+          <a:chOff x="0" y="0"/>
+          <a:chExt cx="0" cy="0"/>
+        </a:xfrm>
+      </p:grpSpPr>
+      <p:sp>
+        <p:nvSpPr>
+          <p:cNvPr id="2" name="Title 1"/>
           <p:cNvSpPr>
             <a:spLocks noGrp="1"/>
           </p:cNvSpPr>
           <p:nvPr>
-            <p:ph idx="1"/>
+            <p:ph type="title"/>
           </p:nvPr>
         </p:nvSpPr>
         <p:spPr/>
@@ -9429,14 +10366,443 @@
           <a:bodyPr/>
           <a:lstStyle/>
           <a:p>
-            <a:endParaRPr lang="en-US"/>
+            <a:r>
+              <a:rPr lang="en-US" b="1" dirty="0" smtClean="0">
+                <a:solidFill>
+                  <a:srgbClr val="0000FF"/>
+                </a:solidFill>
+              </a:rPr>
+              <a:t>Results (</a:t>
+            </a:r>
+            <a:r>
+              <a:rPr lang="en-US" b="1" dirty="0" err="1" smtClean="0">
+                <a:solidFill>
+                  <a:srgbClr val="0000FF"/>
+                </a:solidFill>
+              </a:rPr>
+              <a:t>con’t</a:t>
+            </a:r>
+            <a:r>
+              <a:rPr lang="en-US" b="1" dirty="0" smtClean="0">
+                <a:solidFill>
+                  <a:srgbClr val="0000FF"/>
+                </a:solidFill>
+              </a:rPr>
+              <a:t>)</a:t>
+            </a:r>
+            <a:endParaRPr lang="en-US" b="1" dirty="0">
+              <a:solidFill>
+                <a:srgbClr val="0000FF"/>
+              </a:solidFill>
+            </a:endParaRPr>
+          </a:p>
+        </p:txBody>
+      </p:sp>
+      <p:pic>
+        <p:nvPicPr>
+          <p:cNvPr id="4" name="Picture 3"/>
+          <p:cNvPicPr>
+            <a:picLocks noChangeAspect="1"/>
+          </p:cNvPicPr>
+          <p:nvPr/>
+        </p:nvPicPr>
+        <p:blipFill>
+          <a:blip r:embed="rId2"/>
+          <a:stretch>
+            <a:fillRect/>
+          </a:stretch>
+        </p:blipFill>
+        <p:spPr>
+          <a:xfrm>
+            <a:off x="381000" y="1608138"/>
+            <a:ext cx="2802835" cy="1828800"/>
+          </a:xfrm>
+          <a:prstGeom prst="rect">
+            <a:avLst/>
+          </a:prstGeom>
+          <a:ln w="38100" cap="sq">
+            <a:solidFill>
+              <a:srgbClr val="000000"/>
+            </a:solidFill>
+            <a:prstDash val="solid"/>
+            <a:miter lim="800000"/>
+          </a:ln>
+          <a:effectLst>
+            <a:outerShdw blurRad="50800" dist="38100" dir="2700000" algn="tl" rotWithShape="0">
+              <a:srgbClr val="000000">
+                <a:alpha val="43000"/>
+              </a:srgbClr>
+            </a:outerShdw>
+          </a:effectLst>
+        </p:spPr>
+      </p:pic>
+      <p:pic>
+        <p:nvPicPr>
+          <p:cNvPr id="5" name="Picture 4"/>
+          <p:cNvPicPr>
+            <a:picLocks noChangeAspect="1"/>
+          </p:cNvPicPr>
+          <p:nvPr/>
+        </p:nvPicPr>
+        <p:blipFill>
+          <a:blip r:embed="rId3"/>
+          <a:stretch>
+            <a:fillRect/>
+          </a:stretch>
+        </p:blipFill>
+        <p:spPr>
+          <a:xfrm>
+            <a:off x="3517900" y="1608138"/>
+            <a:ext cx="2464904" cy="1828800"/>
+          </a:xfrm>
+          <a:prstGeom prst="rect">
+            <a:avLst/>
+          </a:prstGeom>
+          <a:ln w="38100" cap="sq">
+            <a:solidFill>
+              <a:srgbClr val="000000"/>
+            </a:solidFill>
+            <a:prstDash val="solid"/>
+            <a:miter lim="800000"/>
+          </a:ln>
+          <a:effectLst>
+            <a:outerShdw blurRad="50800" dist="38100" dir="2700000" algn="tl" rotWithShape="0">
+              <a:srgbClr val="000000">
+                <a:alpha val="43000"/>
+              </a:srgbClr>
+            </a:outerShdw>
+          </a:effectLst>
+        </p:spPr>
+      </p:pic>
+      <p:pic>
+        <p:nvPicPr>
+          <p:cNvPr id="6" name="Picture 5"/>
+          <p:cNvPicPr>
+            <a:picLocks noChangeAspect="1"/>
+          </p:cNvPicPr>
+          <p:nvPr/>
+        </p:nvPicPr>
+        <p:blipFill>
+          <a:blip r:embed="rId4"/>
+          <a:stretch>
+            <a:fillRect/>
+          </a:stretch>
+        </p:blipFill>
+        <p:spPr>
+          <a:xfrm>
+            <a:off x="6299200" y="1608138"/>
+            <a:ext cx="2464904" cy="1828800"/>
+          </a:xfrm>
+          <a:prstGeom prst="rect">
+            <a:avLst/>
+          </a:prstGeom>
+          <a:ln w="38100" cap="sq">
+            <a:solidFill>
+              <a:srgbClr val="000000"/>
+            </a:solidFill>
+            <a:prstDash val="solid"/>
+            <a:miter lim="800000"/>
+          </a:ln>
+          <a:effectLst>
+            <a:outerShdw blurRad="50800" dist="38100" dir="2700000" algn="tl" rotWithShape="0">
+              <a:srgbClr val="000000">
+                <a:alpha val="43000"/>
+              </a:srgbClr>
+            </a:outerShdw>
+          </a:effectLst>
+        </p:spPr>
+      </p:pic>
+      <p:sp>
+        <p:nvSpPr>
+          <p:cNvPr id="7" name="Rectangle 6"/>
+          <p:cNvSpPr/>
+          <p:nvPr/>
+        </p:nvSpPr>
+        <p:spPr>
+          <a:xfrm>
+            <a:off x="1597066" y="5903820"/>
+            <a:ext cx="6035634" cy="881028"/>
+          </a:xfrm>
+          <a:prstGeom prst="rect">
+            <a:avLst/>
+          </a:prstGeom>
+          <a:noFill/>
+          <a:ln w="28575" cmpd="sng">
+            <a:solidFill>
+              <a:srgbClr val="FF0000"/>
+            </a:solidFill>
+          </a:ln>
+          <a:effectLst/>
+        </p:spPr>
+        <p:style>
+          <a:lnRef idx="1">
+            <a:schemeClr val="accent1"/>
+          </a:lnRef>
+          <a:fillRef idx="3">
+            <a:schemeClr val="accent1"/>
+          </a:fillRef>
+          <a:effectRef idx="2">
+            <a:schemeClr val="accent1"/>
+          </a:effectRef>
+          <a:fontRef idx="minor">
+            <a:schemeClr val="lt1"/>
+          </a:fontRef>
+        </p:style>
+        <p:txBody>
+          <a:bodyPr rtlCol="0" anchor="ctr"/>
+          <a:lstStyle/>
+          <a:p>
+            <a:r>
+              <a:rPr lang="en-US" sz="2400" dirty="0" smtClean="0">
+                <a:solidFill>
+                  <a:schemeClr val="tx1"/>
+                </a:solidFill>
+              </a:rPr>
+              <a:t> </a:t>
+            </a:r>
+          </a:p>
+          <a:p>
+            <a:r>
+              <a:rPr lang="en-US" sz="2400" dirty="0" smtClean="0">
+                <a:solidFill>
+                  <a:schemeClr val="tx1"/>
+                </a:solidFill>
+              </a:rPr>
+              <a:t>TOP: Flow estimates obtained by our approach</a:t>
+            </a:r>
+          </a:p>
+          <a:p>
+            <a:r>
+              <a:rPr lang="en-US" sz="2400" dirty="0" smtClean="0">
+                <a:solidFill>
+                  <a:schemeClr val="tx1"/>
+                </a:solidFill>
+              </a:rPr>
+              <a:t>BOTTOM: Ground truth flow estimates</a:t>
+            </a:r>
+            <a:endParaRPr lang="en-US" sz="2400" dirty="0">
+              <a:solidFill>
+                <a:schemeClr val="tx1"/>
+              </a:solidFill>
+            </a:endParaRPr>
+          </a:p>
+          <a:p>
+            <a:endParaRPr lang="en-US" sz="2400" dirty="0">
+              <a:solidFill>
+                <a:schemeClr val="tx1"/>
+              </a:solidFill>
+            </a:endParaRPr>
+          </a:p>
+        </p:txBody>
+      </p:sp>
+      <p:pic>
+        <p:nvPicPr>
+          <p:cNvPr id="8" name="Picture 7"/>
+          <p:cNvPicPr>
+            <a:picLocks noChangeAspect="1"/>
+          </p:cNvPicPr>
+          <p:nvPr/>
+        </p:nvPicPr>
+        <p:blipFill>
+          <a:blip r:embed="rId5"/>
+          <a:stretch>
+            <a:fillRect/>
+          </a:stretch>
+        </p:blipFill>
+        <p:spPr>
+          <a:xfrm>
+            <a:off x="381000" y="3640138"/>
+            <a:ext cx="2802835" cy="1828800"/>
+          </a:xfrm>
+          <a:prstGeom prst="rect">
+            <a:avLst/>
+          </a:prstGeom>
+          <a:ln w="38100" cap="sq">
+            <a:solidFill>
+              <a:srgbClr val="000000"/>
+            </a:solidFill>
+            <a:prstDash val="solid"/>
+            <a:miter lim="800000"/>
+          </a:ln>
+          <a:effectLst>
+            <a:outerShdw blurRad="50800" dist="38100" dir="2700000" algn="tl" rotWithShape="0">
+              <a:srgbClr val="000000">
+                <a:alpha val="43000"/>
+              </a:srgbClr>
+            </a:outerShdw>
+          </a:effectLst>
+        </p:spPr>
+      </p:pic>
+      <p:sp>
+        <p:nvSpPr>
+          <p:cNvPr id="9" name="TextBox 8"/>
+          <p:cNvSpPr txBox="1"/>
+          <p:nvPr/>
+        </p:nvSpPr>
+        <p:spPr>
+          <a:xfrm>
+            <a:off x="1117600" y="1207572"/>
+            <a:ext cx="1449160" cy="400110"/>
+          </a:xfrm>
+          <a:prstGeom prst="rect">
+            <a:avLst/>
+          </a:prstGeom>
+          <a:noFill/>
+        </p:spPr>
+        <p:txBody>
+          <a:bodyPr wrap="none" rtlCol="0">
+            <a:spAutoFit/>
+          </a:bodyPr>
+          <a:lstStyle/>
+          <a:p>
+            <a:r>
+              <a:rPr lang="en-US" sz="2000" u="sng" dirty="0" err="1" smtClean="0"/>
+              <a:t>Dimetrodon</a:t>
+            </a:r>
+            <a:endParaRPr lang="en-US" sz="2000" u="sng" dirty="0"/>
+          </a:p>
+        </p:txBody>
+      </p:sp>
+      <p:pic>
+        <p:nvPicPr>
+          <p:cNvPr id="10" name="Picture 9"/>
+          <p:cNvPicPr>
+            <a:picLocks noChangeAspect="1"/>
+          </p:cNvPicPr>
+          <p:nvPr/>
+        </p:nvPicPr>
+        <p:blipFill>
+          <a:blip r:embed="rId6"/>
+          <a:stretch>
+            <a:fillRect/>
+          </a:stretch>
+        </p:blipFill>
+        <p:spPr>
+          <a:xfrm>
+            <a:off x="3517900" y="3640138"/>
+            <a:ext cx="2464904" cy="1828800"/>
+          </a:xfrm>
+          <a:prstGeom prst="rect">
+            <a:avLst/>
+          </a:prstGeom>
+          <a:ln w="38100" cap="sq">
+            <a:solidFill>
+              <a:srgbClr val="000000"/>
+            </a:solidFill>
+            <a:prstDash val="solid"/>
+            <a:miter lim="800000"/>
+          </a:ln>
+          <a:effectLst>
+            <a:outerShdw blurRad="50800" dist="38100" dir="2700000" algn="tl" rotWithShape="0">
+              <a:srgbClr val="000000">
+                <a:alpha val="43000"/>
+              </a:srgbClr>
+            </a:outerShdw>
+          </a:effectLst>
+        </p:spPr>
+      </p:pic>
+      <p:sp>
+        <p:nvSpPr>
+          <p:cNvPr id="11" name="TextBox 10"/>
+          <p:cNvSpPr txBox="1"/>
+          <p:nvPr/>
+        </p:nvSpPr>
+        <p:spPr>
+          <a:xfrm>
+            <a:off x="4140200" y="1207572"/>
+            <a:ext cx="1002573" cy="400110"/>
+          </a:xfrm>
+          <a:prstGeom prst="rect">
+            <a:avLst/>
+          </a:prstGeom>
+          <a:noFill/>
+        </p:spPr>
+        <p:txBody>
+          <a:bodyPr wrap="none" rtlCol="0">
+            <a:spAutoFit/>
+          </a:bodyPr>
+          <a:lstStyle/>
+          <a:p>
+            <a:r>
+              <a:rPr lang="en-US" sz="2000" u="sng" dirty="0" smtClean="0"/>
+              <a:t>Grove 2</a:t>
+            </a:r>
+            <a:endParaRPr lang="en-US" sz="2000" u="sng" dirty="0"/>
+          </a:p>
+        </p:txBody>
+      </p:sp>
+      <p:pic>
+        <p:nvPicPr>
+          <p:cNvPr id="12" name="Picture 11"/>
+          <p:cNvPicPr>
+            <a:picLocks noChangeAspect="1"/>
+          </p:cNvPicPr>
+          <p:nvPr/>
+        </p:nvPicPr>
+        <p:blipFill>
+          <a:blip r:embed="rId7"/>
+          <a:stretch>
+            <a:fillRect/>
+          </a:stretch>
+        </p:blipFill>
+        <p:spPr>
+          <a:xfrm>
+            <a:off x="6299200" y="3640138"/>
+            <a:ext cx="2464904" cy="1828800"/>
+          </a:xfrm>
+          <a:prstGeom prst="rect">
+            <a:avLst/>
+          </a:prstGeom>
+          <a:ln w="38100" cap="sq">
+            <a:solidFill>
+              <a:srgbClr val="000000"/>
+            </a:solidFill>
+            <a:prstDash val="solid"/>
+            <a:miter lim="800000"/>
+          </a:ln>
+          <a:effectLst>
+            <a:outerShdw blurRad="50800" dist="38100" dir="2700000" algn="tl" rotWithShape="0">
+              <a:srgbClr val="000000">
+                <a:alpha val="43000"/>
+              </a:srgbClr>
+            </a:outerShdw>
+          </a:effectLst>
+        </p:spPr>
+      </p:pic>
+      <p:sp>
+        <p:nvSpPr>
+          <p:cNvPr id="13" name="TextBox 12"/>
+          <p:cNvSpPr txBox="1"/>
+          <p:nvPr/>
+        </p:nvSpPr>
+        <p:spPr>
+          <a:xfrm>
+            <a:off x="7055213" y="1217583"/>
+            <a:ext cx="1002573" cy="400110"/>
+          </a:xfrm>
+          <a:prstGeom prst="rect">
+            <a:avLst/>
+          </a:prstGeom>
+          <a:noFill/>
+        </p:spPr>
+        <p:txBody>
+          <a:bodyPr wrap="none" rtlCol="0">
+            <a:spAutoFit/>
+          </a:bodyPr>
+          <a:lstStyle/>
+          <a:p>
+            <a:r>
+              <a:rPr lang="en-US" sz="2000" u="sng" dirty="0" smtClean="0"/>
+              <a:t>Grove 3</a:t>
+            </a:r>
+            <a:endParaRPr lang="en-US" sz="2000" u="sng" dirty="0"/>
           </a:p>
         </p:txBody>
       </p:sp>
     </p:spTree>
     <p:extLst>
       <p:ext uri="{BB962C8B-B14F-4D97-AF65-F5344CB8AC3E}">
-        <p14:creationId xmlns:p14="http://schemas.microsoft.com/office/powerpoint/2010/main" val="2762439058"/>
+        <p14:creationId xmlns:p14="http://schemas.microsoft.com/office/powerpoint/2010/main" val="24015934"/>
       </p:ext>
     </p:extLst>
   </p:cSld>

</xml_diff>

<commit_message>
last saved  presentation...its yours
</commit_message>
<xml_diff>
--- a/presentation.pptx
+++ b/presentation.pptx
@@ -7119,7 +7119,7 @@
           <a:p>
             <a:r>
               <a:rPr lang="en-US" sz="2400" dirty="0" smtClean="0"/>
-              <a:t>Used Middlebury Optical Flow Training Set (n=8)</a:t>
+              <a:t>Used Middlebury Optical Flow Training Set (n=6)</a:t>
             </a:r>
           </a:p>
           <a:p>
@@ -8037,7 +8037,7 @@
                     <a:p>
                       <a:pPr algn="ctr" fontAlgn="b"/>
                       <a:r>
-                        <a:rPr lang="en-US" sz="2000" b="0" i="0" u="none" strike="noStrike">
+                        <a:rPr lang="en-US" sz="2000" b="0" i="0" u="none" strike="noStrike" dirty="0" err="1">
                           <a:solidFill>
                             <a:srgbClr val="000000"/>
                           </a:solidFill>
@@ -8046,6 +8046,13 @@
                         </a:rPr>
                         <a:t>RubberWhale</a:t>
                       </a:r>
+                      <a:endParaRPr lang="en-US" sz="2000" b="0" i="0" u="none" strike="noStrike" dirty="0">
+                        <a:solidFill>
+                          <a:srgbClr val="000000"/>
+                        </a:solidFill>
+                        <a:effectLst/>
+                        <a:latin typeface="Calibri"/>
+                      </a:endParaRPr>
                     </a:p>
                   </a:txBody>
                   <a:tcPr marL="12700" marR="12700" marT="12700" marB="0" anchor="b"/>

</xml_diff>